<commit_message>
Updated code sample explanation
</commit_message>
<xml_diff>
--- a/Getting Started/1. GettingStarted.pptx
+++ b/Getting Started/1. GettingStarted.pptx
@@ -5,53 +5,56 @@
     <p:sldMasterId id="2147483733" r:id="rId4"/>
   </p:sldMasterIdLst>
   <p:notesMasterIdLst>
-    <p:notesMasterId r:id="rId14"/>
+    <p:notesMasterId r:id="rId17"/>
   </p:notesMasterIdLst>
   <p:handoutMasterIdLst>
-    <p:handoutMasterId r:id="rId15"/>
+    <p:handoutMasterId r:id="rId18"/>
   </p:handoutMasterIdLst>
   <p:sldIdLst>
     <p:sldId id="891" r:id="rId5"/>
     <p:sldId id="880" r:id="rId6"/>
     <p:sldId id="2666" r:id="rId7"/>
     <p:sldId id="2668" r:id="rId8"/>
-    <p:sldId id="2667" r:id="rId9"/>
-    <p:sldId id="2669" r:id="rId10"/>
-    <p:sldId id="2670" r:id="rId11"/>
-    <p:sldId id="2665" r:id="rId12"/>
-    <p:sldId id="887" r:id="rId13"/>
+    <p:sldId id="2671" r:id="rId9"/>
+    <p:sldId id="2667" r:id="rId10"/>
+    <p:sldId id="2669" r:id="rId11"/>
+    <p:sldId id="2670" r:id="rId12"/>
+    <p:sldId id="2672" r:id="rId13"/>
+    <p:sldId id="2673" r:id="rId14"/>
+    <p:sldId id="2665" r:id="rId15"/>
+    <p:sldId id="887" r:id="rId16"/>
   </p:sldIdLst>
   <p:sldSz cx="18288000" cy="10287000"/>
   <p:notesSz cx="6858000" cy="9144000"/>
   <p:embeddedFontLst>
     <p:embeddedFont>
       <p:font typeface="Calibri" panose="020F0502020204030204" pitchFamily="34" charset="0"/>
-      <p:regular r:id="rId16"/>
-      <p:bold r:id="rId17"/>
-      <p:italic r:id="rId18"/>
-      <p:boldItalic r:id="rId19"/>
+      <p:regular r:id="rId19"/>
+      <p:bold r:id="rId20"/>
+      <p:italic r:id="rId21"/>
+      <p:boldItalic r:id="rId22"/>
     </p:embeddedFont>
     <p:embeddedFont>
       <p:font typeface="Proxima Nova" panose="02000506030000020004" pitchFamily="50" charset="0"/>
-      <p:regular r:id="rId20"/>
-      <p:bold r:id="rId21"/>
+      <p:regular r:id="rId23"/>
+      <p:bold r:id="rId24"/>
     </p:embeddedFont>
     <p:embeddedFont>
       <p:font typeface="Proxima Nova Alt Rg" panose="020B0604020202020204" charset="0"/>
-      <p:regular r:id="rId22"/>
-      <p:bold r:id="rId23"/>
+      <p:regular r:id="rId25"/>
+      <p:bold r:id="rId26"/>
     </p:embeddedFont>
     <p:embeddedFont>
       <p:font typeface="PROXIMA NOVA LT SEMIBOLD" panose="020B0604020202020204" charset="0"/>
-      <p:regular r:id="rId24"/>
-      <p:bold r:id="rId25"/>
-      <p:italic r:id="rId26"/>
-      <p:boldItalic r:id="rId27"/>
+      <p:regular r:id="rId27"/>
+      <p:bold r:id="rId28"/>
+      <p:italic r:id="rId29"/>
+      <p:boldItalic r:id="rId30"/>
     </p:embeddedFont>
     <p:embeddedFont>
       <p:font typeface="Proxima Nova Semibold" panose="02000506030000020004" pitchFamily="50" charset="0"/>
-      <p:regular r:id="rId28"/>
-      <p:bold r:id="rId29"/>
+      <p:regular r:id="rId31"/>
+      <p:bold r:id="rId32"/>
     </p:embeddedFont>
   </p:embeddedFontLst>
   <p:defaultTextStyle>
@@ -324,7 +327,7 @@
           <a:p>
             <a:fld id="{B21CBFF7-5FF0-A64B-9FFF-1E3BD05549A7}" type="datetimeFigureOut">
               <a:rPr lang="en-US" smtClean="0"/>
-              <a:t>5/6/2022</a:t>
+              <a:t>5/12/2022</a:t>
             </a:fld>
             <a:endParaRPr lang="en-US"/>
           </a:p>
@@ -506,7 +509,7 @@
             <a:fld id="{11A8D408-CA8A-42D5-ACA6-07BDC4E4D29F}" type="datetimeFigureOut">
               <a:rPr lang="en-GB" smtClean="0"/>
               <a:pPr/>
-              <a:t>06/05/2022</a:t>
+              <a:t>12/05/2022</a:t>
             </a:fld>
             <a:endParaRPr lang="en-GB"/>
           </a:p>
@@ -1112,7 +1115,12 @@
             <p:ph type="sldImg"/>
           </p:nvPr>
         </p:nvSpPr>
-        <p:spPr/>
+        <p:spPr>
+          <a:xfrm>
+            <a:off x="685800" y="1143000"/>
+            <a:ext cx="5486400" cy="3086100"/>
+          </a:xfrm>
+        </p:spPr>
       </p:sp>
       <p:sp>
         <p:nvSpPr>
@@ -1129,7 +1137,28 @@
           <a:bodyPr/>
           <a:lstStyle/>
           <a:p>
-            <a:endParaRPr lang="en-US" dirty="0"/>
+            <a:r>
+              <a:rPr lang="en-US" dirty="0"/>
+              <a:t>The first time you open VSCode, it will prompt you for a basic configuration related to User experience, like the theme, and components you want on your screen, integrating with GitHub. I’m just going to select the theme. We’ll configure git integration later. I’ll click “Mark done”.</a:t>
+            </a:r>
+          </a:p>
+          <a:p>
+            <a:r>
+              <a:rPr lang="en-US" dirty="0"/>
+              <a:t>By default, you see the “Get Started” tab with options to create/open files. I’ll just close it for now.</a:t>
+            </a:r>
+          </a:p>
+          <a:p>
+            <a:r>
+              <a:rPr lang="en-US" dirty="0"/>
+              <a:t>On the top, you have the VSCode Menu and on the left, you have the “Actions “bar.</a:t>
+            </a:r>
+          </a:p>
+          <a:p>
+            <a:r>
+              <a:rPr lang="en-US" dirty="0"/>
+              <a:t>The first button, for file explorer, then you have the search, followed by Source control, run and debug, and then Extensions.</a:t>
+            </a:r>
           </a:p>
         </p:txBody>
       </p:sp>
@@ -1160,7 +1189,7 @@
     </p:spTree>
     <p:extLst>
       <p:ext uri="{BB962C8B-B14F-4D97-AF65-F5344CB8AC3E}">
-        <p14:creationId xmlns:p14="http://schemas.microsoft.com/office/powerpoint/2010/main" val="2424538759"/>
+        <p14:creationId xmlns:p14="http://schemas.microsoft.com/office/powerpoint/2010/main" val="729587247"/>
       </p:ext>
     </p:extLst>
   </p:cSld>
@@ -1245,7 +1274,177 @@
     </p:spTree>
     <p:extLst>
       <p:ext uri="{BB962C8B-B14F-4D97-AF65-F5344CB8AC3E}">
+        <p14:creationId xmlns:p14="http://schemas.microsoft.com/office/powerpoint/2010/main" val="2424538759"/>
+      </p:ext>
+    </p:extLst>
+  </p:cSld>
+  <p:clrMapOvr>
+    <a:masterClrMapping/>
+  </p:clrMapOvr>
+</p:notes>
+</file>
+
+<file path=ppt/notesSlides/notesSlide6.xml><?xml version="1.0" encoding="utf-8"?>
+<p:notes xmlns:a="http://schemas.openxmlformats.org/drawingml/2006/main" xmlns:r="http://schemas.openxmlformats.org/officeDocument/2006/relationships" xmlns:p="http://schemas.openxmlformats.org/presentationml/2006/main">
+  <p:cSld>
+    <p:spTree>
+      <p:nvGrpSpPr>
+        <p:cNvPr id="1" name=""/>
+        <p:cNvGrpSpPr/>
+        <p:nvPr/>
+      </p:nvGrpSpPr>
+      <p:grpSpPr>
+        <a:xfrm>
+          <a:off x="0" y="0"/>
+          <a:ext cx="0" cy="0"/>
+          <a:chOff x="0" y="0"/>
+          <a:chExt cx="0" cy="0"/>
+        </a:xfrm>
+      </p:grpSpPr>
+      <p:sp>
+        <p:nvSpPr>
+          <p:cNvPr id="2" name="Slide Image Placeholder 1"/>
+          <p:cNvSpPr>
+            <a:spLocks noGrp="1" noRot="1" noChangeAspect="1"/>
+          </p:cNvSpPr>
+          <p:nvPr>
+            <p:ph type="sldImg"/>
+          </p:nvPr>
+        </p:nvSpPr>
+        <p:spPr/>
+      </p:sp>
+      <p:sp>
+        <p:nvSpPr>
+          <p:cNvPr id="3" name="Notes Placeholder 2"/>
+          <p:cNvSpPr>
+            <a:spLocks noGrp="1"/>
+          </p:cNvSpPr>
+          <p:nvPr>
+            <p:ph type="body" idx="1"/>
+          </p:nvPr>
+        </p:nvSpPr>
+        <p:spPr/>
+        <p:txBody>
+          <a:bodyPr/>
+          <a:lstStyle/>
+          <a:p>
+            <a:endParaRPr lang="en-US" dirty="0"/>
+          </a:p>
+        </p:txBody>
+      </p:sp>
+      <p:sp>
+        <p:nvSpPr>
+          <p:cNvPr id="4" name="Slide Number Placeholder 3"/>
+          <p:cNvSpPr>
+            <a:spLocks noGrp="1"/>
+          </p:cNvSpPr>
+          <p:nvPr>
+            <p:ph type="sldNum" sz="quarter" idx="5"/>
+          </p:nvPr>
+        </p:nvSpPr>
+        <p:spPr/>
+        <p:txBody>
+          <a:bodyPr/>
+          <a:lstStyle/>
+          <a:p>
+            <a:fld id="{5AD09280-50D6-42FF-8B70-3885FDD34775}" type="slidenum">
+              <a:rPr lang="en-GB" smtClean="0"/>
+              <a:pPr/>
+              <a:t>7</a:t>
+            </a:fld>
+            <a:endParaRPr lang="en-GB"/>
+          </a:p>
+        </p:txBody>
+      </p:sp>
+    </p:spTree>
+    <p:extLst>
+      <p:ext uri="{BB962C8B-B14F-4D97-AF65-F5344CB8AC3E}">
         <p14:creationId xmlns:p14="http://schemas.microsoft.com/office/powerpoint/2010/main" val="719115844"/>
+      </p:ext>
+    </p:extLst>
+  </p:cSld>
+  <p:clrMapOvr>
+    <a:masterClrMapping/>
+  </p:clrMapOvr>
+</p:notes>
+</file>
+
+<file path=ppt/notesSlides/notesSlide7.xml><?xml version="1.0" encoding="utf-8"?>
+<p:notes xmlns:a="http://schemas.openxmlformats.org/drawingml/2006/main" xmlns:r="http://schemas.openxmlformats.org/officeDocument/2006/relationships" xmlns:p="http://schemas.openxmlformats.org/presentationml/2006/main">
+  <p:cSld>
+    <p:spTree>
+      <p:nvGrpSpPr>
+        <p:cNvPr id="1" name=""/>
+        <p:cNvGrpSpPr/>
+        <p:nvPr/>
+      </p:nvGrpSpPr>
+      <p:grpSpPr>
+        <a:xfrm>
+          <a:off x="0" y="0"/>
+          <a:ext cx="0" cy="0"/>
+          <a:chOff x="0" y="0"/>
+          <a:chExt cx="0" cy="0"/>
+        </a:xfrm>
+      </p:grpSpPr>
+      <p:sp>
+        <p:nvSpPr>
+          <p:cNvPr id="2" name="Slide Image Placeholder 1"/>
+          <p:cNvSpPr>
+            <a:spLocks noGrp="1" noRot="1" noChangeAspect="1"/>
+          </p:cNvSpPr>
+          <p:nvPr>
+            <p:ph type="sldImg"/>
+          </p:nvPr>
+        </p:nvSpPr>
+        <p:spPr/>
+      </p:sp>
+      <p:sp>
+        <p:nvSpPr>
+          <p:cNvPr id="3" name="Notes Placeholder 2"/>
+          <p:cNvSpPr>
+            <a:spLocks noGrp="1"/>
+          </p:cNvSpPr>
+          <p:nvPr>
+            <p:ph type="body" idx="1"/>
+          </p:nvPr>
+        </p:nvSpPr>
+        <p:spPr/>
+        <p:txBody>
+          <a:bodyPr/>
+          <a:lstStyle/>
+          <a:p>
+            <a:endParaRPr lang="en-US" dirty="0"/>
+          </a:p>
+        </p:txBody>
+      </p:sp>
+      <p:sp>
+        <p:nvSpPr>
+          <p:cNvPr id="4" name="Slide Number Placeholder 3"/>
+          <p:cNvSpPr>
+            <a:spLocks noGrp="1"/>
+          </p:cNvSpPr>
+          <p:nvPr>
+            <p:ph type="sldNum" sz="quarter" idx="5"/>
+          </p:nvPr>
+        </p:nvSpPr>
+        <p:spPr/>
+        <p:txBody>
+          <a:bodyPr/>
+          <a:lstStyle/>
+          <a:p>
+            <a:fld id="{5AD09280-50D6-42FF-8B70-3885FDD34775}" type="slidenum">
+              <a:rPr lang="en-GB" smtClean="0"/>
+              <a:pPr/>
+              <a:t>10</a:t>
+            </a:fld>
+            <a:endParaRPr lang="en-GB"/>
+          </a:p>
+        </p:txBody>
+      </p:sp>
+    </p:spTree>
+    <p:extLst>
+      <p:ext uri="{BB962C8B-B14F-4D97-AF65-F5344CB8AC3E}">
+        <p14:creationId xmlns:p14="http://schemas.microsoft.com/office/powerpoint/2010/main" val="213073695"/>
       </p:ext>
     </p:extLst>
   </p:cSld>
@@ -1979,7 +2178,7 @@
             <a:fld id="{1D8BD707-D9CF-40AE-B4C6-C98DA3205C09}" type="datetimeFigureOut">
               <a:rPr lang="en-US" smtClean="0"/>
               <a:pPr/>
-              <a:t>5/6/2022</a:t>
+              <a:t>5/12/2022</a:t>
             </a:fld>
             <a:endParaRPr lang="en-US"/>
           </a:p>
@@ -10137,6 +10336,727 @@
 </p:sld>
 </file>
 
+<file path=ppt/slides/slide10.xml><?xml version="1.0" encoding="utf-8"?>
+<p:sld xmlns:a="http://schemas.openxmlformats.org/drawingml/2006/main" xmlns:r="http://schemas.openxmlformats.org/officeDocument/2006/relationships" xmlns:p="http://schemas.openxmlformats.org/presentationml/2006/main">
+  <p:cSld>
+    <p:spTree>
+      <p:nvGrpSpPr>
+        <p:cNvPr id="1" name=""/>
+        <p:cNvGrpSpPr/>
+        <p:nvPr/>
+      </p:nvGrpSpPr>
+      <p:grpSpPr>
+        <a:xfrm>
+          <a:off x="0" y="0"/>
+          <a:ext cx="0" cy="0"/>
+          <a:chOff x="0" y="0"/>
+          <a:chExt cx="0" cy="0"/>
+        </a:xfrm>
+      </p:grpSpPr>
+      <p:sp>
+        <p:nvSpPr>
+          <p:cNvPr id="2" name="Title 1">
+            <a:extLst>
+              <a:ext uri="{FF2B5EF4-FFF2-40B4-BE49-F238E27FC236}">
+                <a16:creationId xmlns:a16="http://schemas.microsoft.com/office/drawing/2014/main" id="{DE6B604E-0D0B-CE9E-9F23-398A85F98320}"/>
+              </a:ext>
+            </a:extLst>
+          </p:cNvPr>
+          <p:cNvSpPr>
+            <a:spLocks noGrp="1"/>
+          </p:cNvSpPr>
+          <p:nvPr>
+            <p:ph type="title"/>
+          </p:nvPr>
+        </p:nvSpPr>
+        <p:spPr/>
+        <p:txBody>
+          <a:bodyPr/>
+          <a:lstStyle/>
+          <a:p>
+            <a:r>
+              <a:rPr lang="en-US" dirty="0"/>
+              <a:t>Python Scripts</a:t>
+            </a:r>
+          </a:p>
+        </p:txBody>
+      </p:sp>
+      <p:sp>
+        <p:nvSpPr>
+          <p:cNvPr id="4" name="Text Placeholder 3">
+            <a:extLst>
+              <a:ext uri="{FF2B5EF4-FFF2-40B4-BE49-F238E27FC236}">
+                <a16:creationId xmlns:a16="http://schemas.microsoft.com/office/drawing/2014/main" id="{72998583-C5BD-C4F6-185A-303867650F82}"/>
+              </a:ext>
+            </a:extLst>
+          </p:cNvPr>
+          <p:cNvSpPr>
+            <a:spLocks noGrp="1"/>
+          </p:cNvSpPr>
+          <p:nvPr>
+            <p:ph type="body" sz="quarter" idx="14"/>
+          </p:nvPr>
+        </p:nvSpPr>
+        <p:spPr>
+          <a:xfrm>
+            <a:off x="1913810" y="1754850"/>
+            <a:ext cx="14857224" cy="754581"/>
+          </a:xfrm>
+        </p:spPr>
+        <p:txBody>
+          <a:bodyPr/>
+          <a:lstStyle/>
+          <a:p>
+            <a:r>
+              <a:rPr lang="en-US" dirty="0"/>
+              <a:t>Upload Data using APIs</a:t>
+            </a:r>
+          </a:p>
+        </p:txBody>
+      </p:sp>
+      <p:sp>
+        <p:nvSpPr>
+          <p:cNvPr id="5" name="Text Placeholder 4">
+            <a:extLst>
+              <a:ext uri="{FF2B5EF4-FFF2-40B4-BE49-F238E27FC236}">
+                <a16:creationId xmlns:a16="http://schemas.microsoft.com/office/drawing/2014/main" id="{4A4F83AD-8D2A-D6BA-C917-9DA49C019E7E}"/>
+              </a:ext>
+            </a:extLst>
+          </p:cNvPr>
+          <p:cNvSpPr>
+            <a:spLocks noGrp="1"/>
+          </p:cNvSpPr>
+          <p:nvPr>
+            <p:ph type="body" sz="quarter" idx="15"/>
+          </p:nvPr>
+        </p:nvSpPr>
+        <p:spPr>
+          <a:xfrm>
+            <a:off x="1938863" y="2509431"/>
+            <a:ext cx="7205137" cy="6152431"/>
+          </a:xfrm>
+        </p:spPr>
+        <p:txBody>
+          <a:bodyPr>
+            <a:normAutofit/>
+          </a:bodyPr>
+          <a:lstStyle/>
+          <a:p>
+            <a:r>
+              <a:rPr lang="en-US" sz="2800" dirty="0"/>
+              <a:t>To upload data using APIs with Python script:</a:t>
+            </a:r>
+          </a:p>
+          <a:p>
+            <a:pPr marL="514350" indent="-514350">
+              <a:buAutoNum type="arabicPeriod"/>
+            </a:pPr>
+            <a:r>
+              <a:rPr lang="en-US" sz="2800" dirty="0"/>
+              <a:t>Install &amp; import relevant packages (Line 1)</a:t>
+            </a:r>
+          </a:p>
+          <a:p>
+            <a:pPr marL="514350" indent="-514350">
+              <a:buAutoNum type="arabicPeriod"/>
+            </a:pPr>
+            <a:r>
+              <a:rPr lang="en-US" sz="2800" dirty="0"/>
+              <a:t>Prepare API request payload (Lines 3-12)</a:t>
+            </a:r>
+          </a:p>
+          <a:p>
+            <a:pPr marL="514350" indent="-514350">
+              <a:buAutoNum type="arabicPeriod"/>
+            </a:pPr>
+            <a:r>
+              <a:rPr lang="en-US" sz="2800" dirty="0"/>
+              <a:t>Prepare the API post/put/patch request (Lines 15-18):</a:t>
+            </a:r>
+          </a:p>
+          <a:p>
+            <a:pPr marL="1145858" lvl="1" indent="-514350">
+              <a:buAutoNum type="arabicPeriod"/>
+            </a:pPr>
+            <a:r>
+              <a:rPr lang="en-US" sz="2000" dirty="0" err="1"/>
+              <a:t>Url</a:t>
+            </a:r>
+            <a:r>
+              <a:rPr lang="en-US" sz="2000" dirty="0"/>
+              <a:t> – URL to access the API (API endpoint)</a:t>
+            </a:r>
+          </a:p>
+          <a:p>
+            <a:pPr marL="1145858" lvl="1" indent="-514350">
+              <a:buAutoNum type="arabicPeriod"/>
+            </a:pPr>
+            <a:r>
+              <a:rPr lang="en-US" sz="2000" dirty="0" err="1"/>
+              <a:t>json</a:t>
+            </a:r>
+            <a:r>
+              <a:rPr lang="en-US" sz="2000" dirty="0"/>
+              <a:t> – </a:t>
+            </a:r>
+            <a:r>
+              <a:rPr lang="en-US" sz="2000"/>
+              <a:t>request payload</a:t>
+            </a:r>
+            <a:endParaRPr lang="en-US" sz="2000" dirty="0"/>
+          </a:p>
+          <a:p>
+            <a:pPr marL="1145858" lvl="1" indent="-514350">
+              <a:buAutoNum type="arabicPeriod"/>
+            </a:pPr>
+            <a:r>
+              <a:rPr lang="en-US" sz="2000" dirty="0"/>
+              <a:t>Headers – Attributes to be included as Header</a:t>
+            </a:r>
+          </a:p>
+          <a:p>
+            <a:pPr marL="514350" indent="-514350">
+              <a:buAutoNum type="arabicPeriod"/>
+            </a:pPr>
+            <a:r>
+              <a:rPr lang="en-US" sz="2800" dirty="0"/>
+              <a:t>Capture the response (Line 20)</a:t>
+            </a:r>
+          </a:p>
+          <a:p>
+            <a:pPr marL="514350" indent="-514350">
+              <a:buAutoNum type="arabicPeriod"/>
+            </a:pPr>
+            <a:r>
+              <a:rPr lang="en-US" sz="2800" dirty="0"/>
+              <a:t>Once you have captured the response, you can transform the data in any way you want. (Lines 7-11)</a:t>
+            </a:r>
+          </a:p>
+        </p:txBody>
+      </p:sp>
+      <p:pic>
+        <p:nvPicPr>
+          <p:cNvPr id="9" name="Picture 8">
+            <a:extLst>
+              <a:ext uri="{FF2B5EF4-FFF2-40B4-BE49-F238E27FC236}">
+                <a16:creationId xmlns:a16="http://schemas.microsoft.com/office/drawing/2014/main" id="{43259804-9A8D-AED6-98F9-324442D733A9}"/>
+              </a:ext>
+            </a:extLst>
+          </p:cNvPr>
+          <p:cNvPicPr>
+            <a:picLocks noChangeAspect="1"/>
+          </p:cNvPicPr>
+          <p:nvPr/>
+        </p:nvPicPr>
+        <p:blipFill>
+          <a:blip r:embed="rId3"/>
+          <a:stretch>
+            <a:fillRect/>
+          </a:stretch>
+        </p:blipFill>
+        <p:spPr>
+          <a:xfrm>
+            <a:off x="9144000" y="3020929"/>
+            <a:ext cx="8800658" cy="4847724"/>
+          </a:xfrm>
+          <a:prstGeom prst="rect">
+            <a:avLst/>
+          </a:prstGeom>
+        </p:spPr>
+      </p:pic>
+    </p:spTree>
+    <p:extLst>
+      <p:ext uri="{BB962C8B-B14F-4D97-AF65-F5344CB8AC3E}">
+        <p14:creationId xmlns:p14="http://schemas.microsoft.com/office/powerpoint/2010/main" val="142940219"/>
+      </p:ext>
+    </p:extLst>
+  </p:cSld>
+  <p:clrMapOvr>
+    <a:masterClrMapping/>
+  </p:clrMapOvr>
+</p:sld>
+</file>
+
+<file path=ppt/slides/slide11.xml><?xml version="1.0" encoding="utf-8"?>
+<p:sld xmlns:a="http://schemas.openxmlformats.org/drawingml/2006/main" xmlns:r="http://schemas.openxmlformats.org/officeDocument/2006/relationships" xmlns:p="http://schemas.openxmlformats.org/presentationml/2006/main">
+  <p:cSld>
+    <p:spTree>
+      <p:nvGrpSpPr>
+        <p:cNvPr id="1" name=""/>
+        <p:cNvGrpSpPr/>
+        <p:nvPr/>
+      </p:nvGrpSpPr>
+      <p:grpSpPr>
+        <a:xfrm>
+          <a:off x="0" y="0"/>
+          <a:ext cx="0" cy="0"/>
+          <a:chOff x="0" y="0"/>
+          <a:chExt cx="0" cy="0"/>
+        </a:xfrm>
+      </p:grpSpPr>
+      <p:sp>
+        <p:nvSpPr>
+          <p:cNvPr id="2" name="Title 1">
+            <a:extLst>
+              <a:ext uri="{FF2B5EF4-FFF2-40B4-BE49-F238E27FC236}">
+                <a16:creationId xmlns:a16="http://schemas.microsoft.com/office/drawing/2014/main" id="{0E6B7BC1-84C7-7BDA-262F-2C6527A99225}"/>
+              </a:ext>
+            </a:extLst>
+          </p:cNvPr>
+          <p:cNvSpPr>
+            <a:spLocks noGrp="1"/>
+          </p:cNvSpPr>
+          <p:nvPr>
+            <p:ph type="title"/>
+          </p:nvPr>
+        </p:nvSpPr>
+        <p:spPr/>
+        <p:txBody>
+          <a:bodyPr/>
+          <a:lstStyle/>
+          <a:p>
+            <a:r>
+              <a:rPr lang="en-US" dirty="0">
+                <a:latin typeface="Proxima Nova" panose="02000506030000020004" pitchFamily="50" charset="0"/>
+              </a:rPr>
+              <a:t>Resources</a:t>
+            </a:r>
+          </a:p>
+        </p:txBody>
+      </p:sp>
+      <p:sp>
+        <p:nvSpPr>
+          <p:cNvPr id="7" name="Content Placeholder 2">
+            <a:extLst>
+              <a:ext uri="{FF2B5EF4-FFF2-40B4-BE49-F238E27FC236}">
+                <a16:creationId xmlns:a16="http://schemas.microsoft.com/office/drawing/2014/main" id="{E23826C6-3A07-A9DB-831D-B821C5CACD82}"/>
+              </a:ext>
+            </a:extLst>
+          </p:cNvPr>
+          <p:cNvSpPr txBox="1">
+            <a:spLocks/>
+          </p:cNvSpPr>
+          <p:nvPr/>
+        </p:nvSpPr>
+        <p:spPr>
+          <a:xfrm>
+            <a:off x="1913810" y="2448798"/>
+            <a:ext cx="8938260" cy="5389404"/>
+          </a:xfrm>
+          <a:prstGeom prst="rect">
+            <a:avLst/>
+          </a:prstGeom>
+        </p:spPr>
+        <p:txBody>
+          <a:bodyPr/>
+          <a:lstStyle>
+            <a:lvl1pPr marL="342900" indent="-342900" algn="l" defTabSz="914400" rtl="0" eaLnBrk="1" latinLnBrk="0" hangingPunct="1">
+              <a:spcBef>
+                <a:spcPct val="20000"/>
+              </a:spcBef>
+              <a:buFont typeface="Arial" pitchFamily="34" charset="0"/>
+              <a:buChar char="•"/>
+              <a:defRPr sz="3200" b="0" i="0" kern="1200">
+                <a:solidFill>
+                  <a:schemeClr val="tx1"/>
+                </a:solidFill>
+                <a:latin typeface="Proxima Nova Alt Rg" panose="02000506030000020004" pitchFamily="2" charset="77"/>
+                <a:ea typeface="+mn-ea"/>
+                <a:cs typeface="+mn-cs"/>
+              </a:defRPr>
+            </a:lvl1pPr>
+            <a:lvl2pPr marL="742950" indent="-285750" algn="l" defTabSz="914400" rtl="0" eaLnBrk="1" latinLnBrk="0" hangingPunct="1">
+              <a:spcBef>
+                <a:spcPct val="20000"/>
+              </a:spcBef>
+              <a:buFont typeface="Arial" pitchFamily="34" charset="0"/>
+              <a:buChar char="–"/>
+              <a:defRPr sz="2800" b="0" i="0" kern="1200">
+                <a:solidFill>
+                  <a:schemeClr val="tx1"/>
+                </a:solidFill>
+                <a:latin typeface="Proxima Nova Alt Rg" panose="02000506030000020004" pitchFamily="2" charset="77"/>
+                <a:ea typeface="+mn-ea"/>
+                <a:cs typeface="+mn-cs"/>
+              </a:defRPr>
+            </a:lvl2pPr>
+            <a:lvl3pPr marL="1143000" indent="-228600" algn="l" defTabSz="914400" rtl="0" eaLnBrk="1" latinLnBrk="0" hangingPunct="1">
+              <a:spcBef>
+                <a:spcPct val="20000"/>
+              </a:spcBef>
+              <a:buFont typeface="Arial" pitchFamily="34" charset="0"/>
+              <a:buChar char="•"/>
+              <a:defRPr sz="2400" b="0" i="0" kern="1200">
+                <a:solidFill>
+                  <a:schemeClr val="tx1"/>
+                </a:solidFill>
+                <a:latin typeface="Proxima Nova Alt Rg" panose="02000506030000020004" pitchFamily="2" charset="77"/>
+                <a:ea typeface="+mn-ea"/>
+                <a:cs typeface="+mn-cs"/>
+              </a:defRPr>
+            </a:lvl3pPr>
+            <a:lvl4pPr marL="1600200" indent="-228600" algn="l" defTabSz="914400" rtl="0" eaLnBrk="1" latinLnBrk="0" hangingPunct="1">
+              <a:spcBef>
+                <a:spcPct val="20000"/>
+              </a:spcBef>
+              <a:buFont typeface="Arial" pitchFamily="34" charset="0"/>
+              <a:buChar char="–"/>
+              <a:defRPr sz="2000" b="0" i="0" kern="1200">
+                <a:solidFill>
+                  <a:schemeClr val="tx1"/>
+                </a:solidFill>
+                <a:latin typeface="Proxima Nova Alt Rg" panose="02000506030000020004" pitchFamily="2" charset="77"/>
+                <a:ea typeface="+mn-ea"/>
+                <a:cs typeface="+mn-cs"/>
+              </a:defRPr>
+            </a:lvl4pPr>
+            <a:lvl5pPr marL="2057400" indent="-228600" algn="l" defTabSz="914400" rtl="0" eaLnBrk="1" latinLnBrk="0" hangingPunct="1">
+              <a:spcBef>
+                <a:spcPct val="20000"/>
+              </a:spcBef>
+              <a:buFont typeface="Arial" pitchFamily="34" charset="0"/>
+              <a:buChar char="»"/>
+              <a:defRPr sz="2000" b="0" i="0" kern="1200">
+                <a:solidFill>
+                  <a:schemeClr val="tx1"/>
+                </a:solidFill>
+                <a:latin typeface="Proxima Nova Alt Rg" panose="02000506030000020004" pitchFamily="2" charset="77"/>
+                <a:ea typeface="+mn-ea"/>
+                <a:cs typeface="+mn-cs"/>
+              </a:defRPr>
+            </a:lvl5pPr>
+            <a:lvl6pPr marL="2514600" indent="-228600" algn="l" defTabSz="914400" rtl="0" eaLnBrk="1" latinLnBrk="0" hangingPunct="1">
+              <a:spcBef>
+                <a:spcPct val="20000"/>
+              </a:spcBef>
+              <a:buFont typeface="Arial" pitchFamily="34" charset="0"/>
+              <a:buChar char="•"/>
+              <a:defRPr sz="2000" kern="1200">
+                <a:solidFill>
+                  <a:schemeClr val="tx1"/>
+                </a:solidFill>
+                <a:latin typeface="+mn-lt"/>
+                <a:ea typeface="+mn-ea"/>
+                <a:cs typeface="+mn-cs"/>
+              </a:defRPr>
+            </a:lvl6pPr>
+            <a:lvl7pPr marL="2971800" indent="-228600" algn="l" defTabSz="914400" rtl="0" eaLnBrk="1" latinLnBrk="0" hangingPunct="1">
+              <a:spcBef>
+                <a:spcPct val="20000"/>
+              </a:spcBef>
+              <a:buFont typeface="Arial" pitchFamily="34" charset="0"/>
+              <a:buChar char="•"/>
+              <a:defRPr sz="2000" kern="1200">
+                <a:solidFill>
+                  <a:schemeClr val="tx1"/>
+                </a:solidFill>
+                <a:latin typeface="+mn-lt"/>
+                <a:ea typeface="+mn-ea"/>
+                <a:cs typeface="+mn-cs"/>
+              </a:defRPr>
+            </a:lvl7pPr>
+            <a:lvl8pPr marL="3429000" indent="-228600" algn="l" defTabSz="914400" rtl="0" eaLnBrk="1" latinLnBrk="0" hangingPunct="1">
+              <a:spcBef>
+                <a:spcPct val="20000"/>
+              </a:spcBef>
+              <a:buFont typeface="Arial" pitchFamily="34" charset="0"/>
+              <a:buChar char="•"/>
+              <a:defRPr sz="2000" kern="1200">
+                <a:solidFill>
+                  <a:schemeClr val="tx1"/>
+                </a:solidFill>
+                <a:latin typeface="+mn-lt"/>
+                <a:ea typeface="+mn-ea"/>
+                <a:cs typeface="+mn-cs"/>
+              </a:defRPr>
+            </a:lvl8pPr>
+            <a:lvl9pPr marL="3886200" indent="-228600" algn="l" defTabSz="914400" rtl="0" eaLnBrk="1" latinLnBrk="0" hangingPunct="1">
+              <a:spcBef>
+                <a:spcPct val="20000"/>
+              </a:spcBef>
+              <a:buFont typeface="Arial" pitchFamily="34" charset="0"/>
+              <a:buChar char="•"/>
+              <a:defRPr sz="2000" kern="1200">
+                <a:solidFill>
+                  <a:schemeClr val="tx1"/>
+                </a:solidFill>
+                <a:latin typeface="+mn-lt"/>
+                <a:ea typeface="+mn-ea"/>
+                <a:cs typeface="+mn-cs"/>
+              </a:defRPr>
+            </a:lvl9pPr>
+          </a:lstStyle>
+          <a:p>
+            <a:r>
+              <a:rPr lang="en-US" sz="2720" dirty="0"/>
+              <a:t>AssetFuture Developer portal:</a:t>
+            </a:r>
+          </a:p>
+          <a:p>
+            <a:pPr lvl="2"/>
+            <a:r>
+              <a:rPr lang="en-US" sz="1920" dirty="0"/>
+              <a:t>Site: </a:t>
+            </a:r>
+            <a:r>
+              <a:rPr lang="en-US" sz="1640" dirty="0">
+                <a:hlinkClick r:id="rId2">
+                  <a:extLst>
+                    <a:ext uri="{A12FA001-AC4F-418D-AE19-62706E023703}">
+                      <ahyp:hlinkClr xmlns:ahyp="http://schemas.microsoft.com/office/drawing/2018/hyperlinkcolor" val="tx"/>
+                    </a:ext>
+                  </a:extLst>
+                </a:hlinkClick>
+              </a:rPr>
+              <a:t>https://developer.assetfuture.com/</a:t>
+            </a:r>
+            <a:endParaRPr lang="en-US" sz="1640" dirty="0"/>
+          </a:p>
+          <a:p>
+            <a:r>
+              <a:rPr lang="en-US" sz="2720" dirty="0"/>
+              <a:t>Learning:</a:t>
+            </a:r>
+          </a:p>
+          <a:p>
+            <a:pPr lvl="1"/>
+            <a:r>
+              <a:rPr lang="en-US" sz="2320" dirty="0"/>
+              <a:t>Python</a:t>
+            </a:r>
+          </a:p>
+          <a:p>
+            <a:pPr lvl="2"/>
+            <a:r>
+              <a:rPr lang="en-US" sz="1640" dirty="0"/>
+              <a:t>Official site: </a:t>
+            </a:r>
+            <a:r>
+              <a:rPr lang="en-US" sz="1640" dirty="0">
+                <a:hlinkClick r:id="rId3"/>
+              </a:rPr>
+              <a:t>https://www.python.org/about/gettingstarted/</a:t>
+            </a:r>
+            <a:endParaRPr lang="en-US" sz="1640" dirty="0"/>
+          </a:p>
+          <a:p>
+            <a:pPr lvl="1"/>
+            <a:r>
+              <a:rPr lang="en-US" sz="2040" dirty="0"/>
+              <a:t>VSCode</a:t>
+            </a:r>
+          </a:p>
+          <a:p>
+            <a:pPr lvl="2"/>
+            <a:r>
+              <a:rPr lang="en-US" sz="1640" dirty="0"/>
+              <a:t>Official site: </a:t>
+            </a:r>
+            <a:r>
+              <a:rPr lang="en-US" sz="1640" dirty="0">
+                <a:hlinkClick r:id="rId4"/>
+              </a:rPr>
+              <a:t>https://code.visualstudio.com/docs/introvideos/basics</a:t>
+            </a:r>
+            <a:endParaRPr lang="en-US" sz="1640" dirty="0"/>
+          </a:p>
+          <a:p>
+            <a:pPr marL="914400" lvl="2" indent="0">
+              <a:buNone/>
+            </a:pPr>
+            <a:endParaRPr lang="en-US" sz="1640" dirty="0"/>
+          </a:p>
+          <a:p>
+            <a:r>
+              <a:rPr lang="en-US" sz="2720" dirty="0"/>
+              <a:t>Installers</a:t>
+            </a:r>
+            <a:endParaRPr lang="en-US" sz="2720" dirty="0">
+              <a:hlinkClick r:id="rId5"/>
+            </a:endParaRPr>
+          </a:p>
+          <a:p>
+            <a:pPr lvl="1"/>
+            <a:r>
+              <a:rPr lang="en-US" sz="2320" dirty="0">
+                <a:hlinkClick r:id="rId5"/>
+              </a:rPr>
+              <a:t>Python 3.10.4</a:t>
+            </a:r>
+            <a:endParaRPr lang="en-US" sz="2320" dirty="0"/>
+          </a:p>
+          <a:p>
+            <a:pPr lvl="2"/>
+            <a:r>
+              <a:rPr lang="en-US" sz="1640" dirty="0"/>
+              <a:t>Official site - </a:t>
+            </a:r>
+            <a:r>
+              <a:rPr lang="en-US" sz="1640" dirty="0">
+                <a:hlinkClick r:id="rId6"/>
+              </a:rPr>
+              <a:t>https://www.python.org/downloads/</a:t>
+            </a:r>
+            <a:endParaRPr lang="en-US" sz="2720" dirty="0">
+              <a:hlinkClick r:id="rId7"/>
+            </a:endParaRPr>
+          </a:p>
+          <a:p>
+            <a:pPr lvl="1"/>
+            <a:r>
+              <a:rPr lang="en-US" sz="2320" dirty="0">
+                <a:hlinkClick r:id="rId7"/>
+              </a:rPr>
+              <a:t>VSCode</a:t>
+            </a:r>
+            <a:r>
+              <a:rPr lang="en-US" sz="2320" dirty="0"/>
+              <a:t> </a:t>
+            </a:r>
+          </a:p>
+          <a:p>
+            <a:pPr lvl="2"/>
+            <a:r>
+              <a:rPr lang="en-US" sz="1640" dirty="0"/>
+              <a:t>Official site - </a:t>
+            </a:r>
+            <a:r>
+              <a:rPr lang="en-US" sz="1640" dirty="0">
+                <a:hlinkClick r:id="rId8"/>
+              </a:rPr>
+              <a:t>https://code.visualstudio.com/download</a:t>
+            </a:r>
+            <a:endParaRPr lang="en-US" sz="1640" dirty="0"/>
+          </a:p>
+          <a:p>
+            <a:endParaRPr lang="en-US" sz="2440" dirty="0"/>
+          </a:p>
+        </p:txBody>
+      </p:sp>
+    </p:spTree>
+    <p:extLst>
+      <p:ext uri="{BB962C8B-B14F-4D97-AF65-F5344CB8AC3E}">
+        <p14:creationId xmlns:p14="http://schemas.microsoft.com/office/powerpoint/2010/main" val="2045114893"/>
+      </p:ext>
+    </p:extLst>
+  </p:cSld>
+  <p:clrMapOvr>
+    <a:masterClrMapping/>
+  </p:clrMapOvr>
+</p:sld>
+</file>
+
+<file path=ppt/slides/slide12.xml><?xml version="1.0" encoding="utf-8"?>
+<p:sld xmlns:a="http://schemas.openxmlformats.org/drawingml/2006/main" xmlns:r="http://schemas.openxmlformats.org/officeDocument/2006/relationships" xmlns:p="http://schemas.openxmlformats.org/presentationml/2006/main">
+  <p:cSld>
+    <p:bg>
+      <p:bgPr>
+        <a:solidFill>
+          <a:schemeClr val="tx1"/>
+        </a:solidFill>
+        <a:effectLst/>
+      </p:bgPr>
+    </p:bg>
+    <p:spTree>
+      <p:nvGrpSpPr>
+        <p:cNvPr id="1" name=""/>
+        <p:cNvGrpSpPr/>
+        <p:nvPr/>
+      </p:nvGrpSpPr>
+      <p:grpSpPr>
+        <a:xfrm>
+          <a:off x="0" y="0"/>
+          <a:ext cx="0" cy="0"/>
+          <a:chOff x="0" y="0"/>
+          <a:chExt cx="0" cy="0"/>
+        </a:xfrm>
+      </p:grpSpPr>
+      <p:sp>
+        <p:nvSpPr>
+          <p:cNvPr id="7" name="Title 1">
+            <a:extLst>
+              <a:ext uri="{FF2B5EF4-FFF2-40B4-BE49-F238E27FC236}">
+                <a16:creationId xmlns:a16="http://schemas.microsoft.com/office/drawing/2014/main" id="{A995580D-4D36-D64F-826F-5A991AD9F8BC}"/>
+              </a:ext>
+            </a:extLst>
+          </p:cNvPr>
+          <p:cNvSpPr>
+            <a:spLocks noGrp="1"/>
+          </p:cNvSpPr>
+          <p:nvPr>
+            <p:ph type="title"/>
+          </p:nvPr>
+        </p:nvSpPr>
+        <p:spPr>
+          <a:xfrm>
+            <a:off x="6663567" y="4183489"/>
+            <a:ext cx="4960869" cy="2111771"/>
+          </a:xfrm>
+        </p:spPr>
+        <p:txBody>
+          <a:bodyPr/>
+          <a:lstStyle/>
+          <a:p>
+            <a:pPr algn="ctr"/>
+            <a:r>
+              <a:rPr lang="en-US">
+                <a:solidFill>
+                  <a:schemeClr val="bg1"/>
+                </a:solidFill>
+              </a:rPr>
+              <a:t>Thank you</a:t>
+            </a:r>
+          </a:p>
+        </p:txBody>
+      </p:sp>
+      <p:pic>
+        <p:nvPicPr>
+          <p:cNvPr id="9" name="Picture Placeholder 7">
+            <a:extLst>
+              <a:ext uri="{FF2B5EF4-FFF2-40B4-BE49-F238E27FC236}">
+                <a16:creationId xmlns:a16="http://schemas.microsoft.com/office/drawing/2014/main" id="{C4A0EFB0-883F-5B48-A8C4-15820844DF97}"/>
+              </a:ext>
+            </a:extLst>
+          </p:cNvPr>
+          <p:cNvPicPr>
+            <a:picLocks noChangeAspect="1"/>
+          </p:cNvPicPr>
+          <p:nvPr/>
+        </p:nvPicPr>
+        <p:blipFill>
+          <a:blip r:embed="rId2">
+            <a:extLst>
+              <a:ext uri="{28A0092B-C50C-407E-A947-70E740481C1C}">
+                <a14:useLocalDpi xmlns:a14="http://schemas.microsoft.com/office/drawing/2010/main" val="0"/>
+              </a:ext>
+            </a:extLst>
+          </a:blip>
+          <a:srcRect/>
+          <a:stretch/>
+        </p:blipFill>
+        <p:spPr>
+          <a:xfrm>
+            <a:off x="8445365" y="3062967"/>
+            <a:ext cx="1397273" cy="1397273"/>
+          </a:xfrm>
+          <a:prstGeom prst="rect">
+            <a:avLst/>
+          </a:prstGeom>
+        </p:spPr>
+      </p:pic>
+    </p:spTree>
+    <p:extLst>
+      <p:ext uri="{BB962C8B-B14F-4D97-AF65-F5344CB8AC3E}">
+        <p14:creationId xmlns:p14="http://schemas.microsoft.com/office/powerpoint/2010/main" val="3802704287"/>
+      </p:ext>
+    </p:extLst>
+  </p:cSld>
+  <p:clrMapOvr>
+    <a:masterClrMapping/>
+  </p:clrMapOvr>
+</p:sld>
+</file>
+
 <file path=ppt/slides/slide2.xml><?xml version="1.0" encoding="utf-8"?>
 <p:sld xmlns:a="http://schemas.openxmlformats.org/drawingml/2006/main" xmlns:r="http://schemas.openxmlformats.org/officeDocument/2006/relationships" xmlns:p="http://schemas.openxmlformats.org/presentationml/2006/main">
   <p:cSld>
@@ -10757,7 +11677,7 @@
           <p:cNvPr id="2" name="Title 1">
             <a:extLst>
               <a:ext uri="{FF2B5EF4-FFF2-40B4-BE49-F238E27FC236}">
-                <a16:creationId xmlns:a16="http://schemas.microsoft.com/office/drawing/2014/main" id="{1BFA49FD-4C6C-E98D-A422-C3AE7CBDC11F}"/>
+                <a16:creationId xmlns:a16="http://schemas.microsoft.com/office/drawing/2014/main" id="{4AE986CF-DA6E-2128-2488-40429E00CB62}"/>
               </a:ext>
             </a:extLst>
           </p:cNvPr>
@@ -10775,7 +11695,7 @@
           <a:p>
             <a:r>
               <a:rPr lang="en-US" dirty="0"/>
-              <a:t>Packages &amp; Extensions</a:t>
+              <a:t>Environment Setup</a:t>
             </a:r>
           </a:p>
         </p:txBody>
@@ -10785,7 +11705,7 @@
           <p:cNvPr id="4" name="Text Placeholder 3">
             <a:extLst>
               <a:ext uri="{FF2B5EF4-FFF2-40B4-BE49-F238E27FC236}">
-                <a16:creationId xmlns:a16="http://schemas.microsoft.com/office/drawing/2014/main" id="{41FB09B9-F91B-ED91-63CF-ABDD10526E82}"/>
+                <a16:creationId xmlns:a16="http://schemas.microsoft.com/office/drawing/2014/main" id="{F9AB9530-70F1-ECB0-E50A-E13DDA50896B}"/>
               </a:ext>
             </a:extLst>
           </p:cNvPr>
@@ -10798,7 +11718,7 @@
         </p:nvSpPr>
         <p:spPr>
           <a:xfrm>
-            <a:off x="1913810" y="1687513"/>
+            <a:off x="2998339" y="2319318"/>
             <a:ext cx="12628639" cy="641394"/>
           </a:xfrm>
         </p:spPr>
@@ -10809,6 +11729,208 @@
           <a:lstStyle/>
           <a:p>
             <a:r>
+              <a:rPr lang="en-US"/>
+              <a:t>Installing GitHub Desktop</a:t>
+            </a:r>
+            <a:endParaRPr lang="en-US" dirty="0"/>
+          </a:p>
+        </p:txBody>
+      </p:sp>
+      <p:sp>
+        <p:nvSpPr>
+          <p:cNvPr id="6" name="Text Placeholder 5">
+            <a:extLst>
+              <a:ext uri="{FF2B5EF4-FFF2-40B4-BE49-F238E27FC236}">
+                <a16:creationId xmlns:a16="http://schemas.microsoft.com/office/drawing/2014/main" id="{2C5DB2AD-26BE-6507-41BE-D569F3B3CF31}"/>
+              </a:ext>
+            </a:extLst>
+          </p:cNvPr>
+          <p:cNvSpPr>
+            <a:spLocks noGrp="1"/>
+          </p:cNvSpPr>
+          <p:nvPr>
+            <p:ph type="body" sz="quarter" idx="16"/>
+          </p:nvPr>
+        </p:nvSpPr>
+        <p:spPr>
+          <a:xfrm>
+            <a:off x="2998339" y="3074116"/>
+            <a:ext cx="12628639" cy="3842344"/>
+          </a:xfrm>
+        </p:spPr>
+        <p:txBody>
+          <a:bodyPr>
+            <a:normAutofit/>
+          </a:bodyPr>
+          <a:lstStyle/>
+          <a:p>
+            <a:r>
+              <a:rPr lang="en-US" sz="1700" dirty="0"/>
+              <a:t>Download &amp; open the VSCode installer</a:t>
+            </a:r>
+          </a:p>
+          <a:p>
+            <a:pPr lvl="1"/>
+            <a:r>
+              <a:rPr lang="en-US" sz="1020" dirty="0"/>
+              <a:t>Remember to check “Add Python to PATH”</a:t>
+            </a:r>
+          </a:p>
+          <a:p>
+            <a:r>
+              <a:rPr lang="en-US" sz="1700" dirty="0"/>
+              <a:t>Launch VSCode</a:t>
+            </a:r>
+          </a:p>
+          <a:p>
+            <a:pPr lvl="1"/>
+            <a:r>
+              <a:rPr lang="en-US" sz="1020" dirty="0"/>
+              <a:t>Start menu</a:t>
+            </a:r>
+          </a:p>
+          <a:p>
+            <a:pPr lvl="1"/>
+            <a:r>
+              <a:rPr lang="en-US" sz="1020" dirty="0"/>
+              <a:t>Win + R and type code</a:t>
+            </a:r>
+          </a:p>
+          <a:p>
+            <a:r>
+              <a:rPr lang="en-US" sz="1700" dirty="0"/>
+              <a:t>Initial configuration</a:t>
+            </a:r>
+          </a:p>
+          <a:p>
+            <a:pPr lvl="1"/>
+            <a:endParaRPr lang="en-US" sz="1020" dirty="0"/>
+          </a:p>
+          <a:p>
+            <a:pPr marL="388620" lvl="1" indent="0">
+              <a:buNone/>
+            </a:pPr>
+            <a:endParaRPr lang="en-US" sz="1020" dirty="0"/>
+          </a:p>
+        </p:txBody>
+      </p:sp>
+      <p:pic>
+        <p:nvPicPr>
+          <p:cNvPr id="5" name="Picture 4">
+            <a:extLst>
+              <a:ext uri="{FF2B5EF4-FFF2-40B4-BE49-F238E27FC236}">
+                <a16:creationId xmlns:a16="http://schemas.microsoft.com/office/drawing/2014/main" id="{EB4D0269-AB80-4CC3-E568-5574BFDA0CB7}"/>
+              </a:ext>
+            </a:extLst>
+          </p:cNvPr>
+          <p:cNvPicPr>
+            <a:picLocks noChangeAspect="1"/>
+          </p:cNvPicPr>
+          <p:nvPr/>
+        </p:nvPicPr>
+        <p:blipFill>
+          <a:blip r:embed="rId3"/>
+          <a:stretch>
+            <a:fillRect/>
+          </a:stretch>
+        </p:blipFill>
+        <p:spPr>
+          <a:xfrm>
+            <a:off x="9144002" y="2319316"/>
+            <a:ext cx="5756434" cy="4362098"/>
+          </a:xfrm>
+          <a:prstGeom prst="rect">
+            <a:avLst/>
+          </a:prstGeom>
+        </p:spPr>
+      </p:pic>
+    </p:spTree>
+    <p:extLst>
+      <p:ext uri="{BB962C8B-B14F-4D97-AF65-F5344CB8AC3E}">
+        <p14:creationId xmlns:p14="http://schemas.microsoft.com/office/powerpoint/2010/main" val="1628914208"/>
+      </p:ext>
+    </p:extLst>
+  </p:cSld>
+  <p:clrMapOvr>
+    <a:masterClrMapping/>
+  </p:clrMapOvr>
+</p:sld>
+</file>
+
+<file path=ppt/slides/slide6.xml><?xml version="1.0" encoding="utf-8"?>
+<p:sld xmlns:a="http://schemas.openxmlformats.org/drawingml/2006/main" xmlns:r="http://schemas.openxmlformats.org/officeDocument/2006/relationships" xmlns:p="http://schemas.openxmlformats.org/presentationml/2006/main">
+  <p:cSld>
+    <p:spTree>
+      <p:nvGrpSpPr>
+        <p:cNvPr id="1" name=""/>
+        <p:cNvGrpSpPr/>
+        <p:nvPr/>
+      </p:nvGrpSpPr>
+      <p:grpSpPr>
+        <a:xfrm>
+          <a:off x="0" y="0"/>
+          <a:ext cx="0" cy="0"/>
+          <a:chOff x="0" y="0"/>
+          <a:chExt cx="0" cy="0"/>
+        </a:xfrm>
+      </p:grpSpPr>
+      <p:sp>
+        <p:nvSpPr>
+          <p:cNvPr id="2" name="Title 1">
+            <a:extLst>
+              <a:ext uri="{FF2B5EF4-FFF2-40B4-BE49-F238E27FC236}">
+                <a16:creationId xmlns:a16="http://schemas.microsoft.com/office/drawing/2014/main" id="{1BFA49FD-4C6C-E98D-A422-C3AE7CBDC11F}"/>
+              </a:ext>
+            </a:extLst>
+          </p:cNvPr>
+          <p:cNvSpPr>
+            <a:spLocks noGrp="1"/>
+          </p:cNvSpPr>
+          <p:nvPr>
+            <p:ph type="title"/>
+          </p:nvPr>
+        </p:nvSpPr>
+        <p:spPr/>
+        <p:txBody>
+          <a:bodyPr/>
+          <a:lstStyle/>
+          <a:p>
+            <a:r>
+              <a:rPr lang="en-US" dirty="0"/>
+              <a:t>Packages &amp; Extensions</a:t>
+            </a:r>
+          </a:p>
+        </p:txBody>
+      </p:sp>
+      <p:sp>
+        <p:nvSpPr>
+          <p:cNvPr id="4" name="Text Placeholder 3">
+            <a:extLst>
+              <a:ext uri="{FF2B5EF4-FFF2-40B4-BE49-F238E27FC236}">
+                <a16:creationId xmlns:a16="http://schemas.microsoft.com/office/drawing/2014/main" id="{41FB09B9-F91B-ED91-63CF-ABDD10526E82}"/>
+              </a:ext>
+            </a:extLst>
+          </p:cNvPr>
+          <p:cNvSpPr>
+            <a:spLocks noGrp="1"/>
+          </p:cNvSpPr>
+          <p:nvPr>
+            <p:ph type="body" sz="quarter" idx="14"/>
+          </p:nvPr>
+        </p:nvSpPr>
+        <p:spPr>
+          <a:xfrm>
+            <a:off x="1913810" y="1687513"/>
+            <a:ext cx="12628639" cy="641394"/>
+          </a:xfrm>
+        </p:spPr>
+        <p:txBody>
+          <a:bodyPr>
+            <a:normAutofit lnSpcReduction="10000"/>
+          </a:bodyPr>
+          <a:lstStyle/>
+          <a:p>
+            <a:r>
               <a:rPr lang="en-US" dirty="0"/>
               <a:t>Python Packages</a:t>
             </a:r>
@@ -10839,60 +11961,77 @@
         </p:spPr>
         <p:txBody>
           <a:bodyPr>
-            <a:normAutofit fontScale="92500" lnSpcReduction="10000"/>
+            <a:noAutofit/>
           </a:bodyPr>
           <a:lstStyle/>
           <a:p>
             <a:r>
-              <a:rPr lang="en-US" sz="1800" dirty="0"/>
+              <a:rPr lang="en-US" sz="1400" dirty="0"/>
               <a:t>Requests (Send </a:t>
             </a:r>
             <a:r>
-              <a:rPr lang="en-US" sz="1800" dirty="0" err="1"/>
+              <a:rPr lang="en-US" sz="1400" dirty="0" err="1"/>
               <a:t>api</a:t>
             </a:r>
             <a:r>
-              <a:rPr lang="en-US" sz="1800" dirty="0"/>
+              <a:rPr lang="en-US" sz="1400" dirty="0"/>
               <a:t> requests)</a:t>
             </a:r>
           </a:p>
           <a:p>
             <a:pPr lvl="1"/>
             <a:r>
-              <a:rPr lang="en-US" sz="1500" dirty="0"/>
+              <a:rPr lang="en-US" sz="1400" dirty="0"/>
               <a:t>pip install requests</a:t>
             </a:r>
           </a:p>
           <a:p>
             <a:r>
-              <a:rPr lang="en-US" sz="1800" dirty="0" err="1"/>
+              <a:rPr lang="en-US" sz="1400" dirty="0" err="1"/>
               <a:t>Json</a:t>
             </a:r>
-            <a:endParaRPr lang="en-US" sz="1500" dirty="0"/>
+            <a:endParaRPr lang="en-US" sz="1400" dirty="0"/>
           </a:p>
           <a:p>
             <a:pPr lvl="1"/>
             <a:r>
-              <a:rPr lang="en-US" sz="1500" dirty="0"/>
+              <a:rPr lang="en-US" sz="1400" dirty="0"/>
               <a:t>pip install </a:t>
             </a:r>
             <a:r>
-              <a:rPr lang="en-US" sz="1500" dirty="0" err="1"/>
+              <a:rPr lang="en-US" sz="1400" dirty="0" err="1"/>
               <a:t>json</a:t>
             </a:r>
-            <a:endParaRPr lang="en-US" sz="1500" dirty="0"/>
-          </a:p>
-          <a:p>
-            <a:r>
-              <a:rPr lang="en-US" sz="1800" dirty="0"/>
+            <a:endParaRPr lang="en-US" sz="1400" dirty="0"/>
+          </a:p>
+          <a:p>
+            <a:r>
+              <a:rPr lang="en-US" sz="1400" dirty="0"/>
               <a:t>Pandas (Reading from an excel)</a:t>
             </a:r>
           </a:p>
           <a:p>
             <a:pPr lvl="1"/>
             <a:r>
-              <a:rPr lang="en-US" sz="1500" dirty="0"/>
+              <a:rPr lang="en-US" sz="1400" dirty="0"/>
               <a:t>pip install pandas</a:t>
+            </a:r>
+          </a:p>
+          <a:p>
+            <a:r>
+              <a:rPr lang="en-US" sz="1400" dirty="0" err="1"/>
+              <a:t>Uuid</a:t>
+            </a:r>
+            <a:r>
+              <a:rPr lang="en-US" sz="1400" dirty="0"/>
+              <a:t> (Generate unique identifiers)</a:t>
+            </a:r>
+          </a:p>
+          <a:p>
+            <a:pPr lvl="1"/>
+            <a:r>
+              <a:rPr lang="en-US" sz="1400" dirty="0"/>
+              <a:t>Included in default packages</a:t>
             </a:r>
           </a:p>
         </p:txBody>
@@ -11276,230 +12415,6 @@
 </p:sld>
 </file>
 
-<file path=ppt/slides/slide6.xml><?xml version="1.0" encoding="utf-8"?>
-<p:sld xmlns:a="http://schemas.openxmlformats.org/drawingml/2006/main" xmlns:r="http://schemas.openxmlformats.org/officeDocument/2006/relationships" xmlns:p="http://schemas.openxmlformats.org/presentationml/2006/main">
-  <p:cSld>
-    <p:spTree>
-      <p:nvGrpSpPr>
-        <p:cNvPr id="1" name=""/>
-        <p:cNvGrpSpPr/>
-        <p:nvPr/>
-      </p:nvGrpSpPr>
-      <p:grpSpPr>
-        <a:xfrm>
-          <a:off x="0" y="0"/>
-          <a:ext cx="0" cy="0"/>
-          <a:chOff x="0" y="0"/>
-          <a:chExt cx="0" cy="0"/>
-        </a:xfrm>
-      </p:grpSpPr>
-      <p:sp>
-        <p:nvSpPr>
-          <p:cNvPr id="2" name="Title 1">
-            <a:extLst>
-              <a:ext uri="{FF2B5EF4-FFF2-40B4-BE49-F238E27FC236}">
-                <a16:creationId xmlns:a16="http://schemas.microsoft.com/office/drawing/2014/main" id="{66E9E7E8-8395-CE35-E099-E982CC088362}"/>
-              </a:ext>
-            </a:extLst>
-          </p:cNvPr>
-          <p:cNvSpPr>
-            <a:spLocks noGrp="1"/>
-          </p:cNvSpPr>
-          <p:nvPr>
-            <p:ph type="title"/>
-          </p:nvPr>
-        </p:nvSpPr>
-        <p:spPr/>
-        <p:txBody>
-          <a:bodyPr/>
-          <a:lstStyle/>
-          <a:p>
-            <a:r>
-              <a:rPr lang="en-US" dirty="0"/>
-              <a:t>VSCode</a:t>
-            </a:r>
-          </a:p>
-        </p:txBody>
-      </p:sp>
-      <p:sp>
-        <p:nvSpPr>
-          <p:cNvPr id="3" name="Picture Placeholder 2">
-            <a:extLst>
-              <a:ext uri="{FF2B5EF4-FFF2-40B4-BE49-F238E27FC236}">
-                <a16:creationId xmlns:a16="http://schemas.microsoft.com/office/drawing/2014/main" id="{0EC18760-1AE3-BC05-FDA7-1DB5016B5EE8}"/>
-              </a:ext>
-            </a:extLst>
-          </p:cNvPr>
-          <p:cNvSpPr>
-            <a:spLocks noGrp="1"/>
-          </p:cNvSpPr>
-          <p:nvPr>
-            <p:ph type="pic" sz="quarter" idx="13"/>
-          </p:nvPr>
-        </p:nvSpPr>
-        <p:spPr/>
-      </p:sp>
-      <p:sp>
-        <p:nvSpPr>
-          <p:cNvPr id="4" name="Text Placeholder 3">
-            <a:extLst>
-              <a:ext uri="{FF2B5EF4-FFF2-40B4-BE49-F238E27FC236}">
-                <a16:creationId xmlns:a16="http://schemas.microsoft.com/office/drawing/2014/main" id="{13B1973E-61C0-CFB1-F807-35FF2760637B}"/>
-              </a:ext>
-            </a:extLst>
-          </p:cNvPr>
-          <p:cNvSpPr>
-            <a:spLocks noGrp="1"/>
-          </p:cNvSpPr>
-          <p:nvPr>
-            <p:ph type="body" sz="quarter" idx="14"/>
-          </p:nvPr>
-        </p:nvSpPr>
-        <p:spPr>
-          <a:xfrm>
-            <a:off x="1938863" y="1861769"/>
-            <a:ext cx="14857224" cy="754581"/>
-          </a:xfrm>
-        </p:spPr>
-        <p:txBody>
-          <a:bodyPr/>
-          <a:lstStyle/>
-          <a:p>
-            <a:r>
-              <a:rPr lang="en-US" dirty="0"/>
-              <a:t>Clone repository</a:t>
-            </a:r>
-          </a:p>
-        </p:txBody>
-      </p:sp>
-      <p:sp>
-        <p:nvSpPr>
-          <p:cNvPr id="6" name="Text Placeholder 5">
-            <a:extLst>
-              <a:ext uri="{FF2B5EF4-FFF2-40B4-BE49-F238E27FC236}">
-                <a16:creationId xmlns:a16="http://schemas.microsoft.com/office/drawing/2014/main" id="{1490B96C-852F-89F0-18DE-558F8B369F31}"/>
-              </a:ext>
-            </a:extLst>
-          </p:cNvPr>
-          <p:cNvSpPr>
-            <a:spLocks noGrp="1"/>
-          </p:cNvSpPr>
-          <p:nvPr>
-            <p:ph type="body" sz="quarter" idx="16"/>
-          </p:nvPr>
-        </p:nvSpPr>
-        <p:spPr>
-          <a:xfrm>
-            <a:off x="1938863" y="2790607"/>
-            <a:ext cx="14857224" cy="2133676"/>
-          </a:xfrm>
-        </p:spPr>
-        <p:txBody>
-          <a:bodyPr>
-            <a:normAutofit/>
-          </a:bodyPr>
-          <a:lstStyle/>
-          <a:p>
-            <a:r>
-              <a:rPr lang="en-US" sz="1700" dirty="0"/>
-              <a:t>Under source control</a:t>
-            </a:r>
-          </a:p>
-          <a:p>
-            <a:pPr lvl="1"/>
-            <a:r>
-              <a:rPr lang="en-US" sz="1020" dirty="0"/>
-              <a:t>Clone Repository</a:t>
-            </a:r>
-          </a:p>
-          <a:p>
-            <a:pPr lvl="1"/>
-            <a:r>
-              <a:rPr lang="en-US" sz="1020" dirty="0"/>
-              <a:t>Provide the repository </a:t>
-            </a:r>
-            <a:r>
-              <a:rPr lang="en-US" sz="1020" dirty="0" err="1"/>
-              <a:t>Url</a:t>
-            </a:r>
-            <a:endParaRPr lang="en-US" sz="1020" dirty="0"/>
-          </a:p>
-          <a:p>
-            <a:pPr lvl="1"/>
-            <a:r>
-              <a:rPr lang="en-US" sz="1020" dirty="0"/>
-              <a:t>Select the repository location</a:t>
-            </a:r>
-          </a:p>
-          <a:p>
-            <a:r>
-              <a:rPr lang="en-US" sz="1700" dirty="0"/>
-              <a:t>Open the folder</a:t>
-            </a:r>
-          </a:p>
-          <a:p>
-            <a:pPr lvl="1"/>
-            <a:r>
-              <a:rPr lang="en-US" sz="1020" dirty="0"/>
-              <a:t>Open Explorer from “Actions” Bar</a:t>
-            </a:r>
-          </a:p>
-          <a:p>
-            <a:pPr lvl="1"/>
-            <a:r>
-              <a:rPr lang="en-US" sz="1020" dirty="0"/>
-              <a:t>Open folder</a:t>
-            </a:r>
-          </a:p>
-          <a:p>
-            <a:pPr lvl="1"/>
-            <a:endParaRPr lang="en-US" sz="1020" dirty="0"/>
-          </a:p>
-        </p:txBody>
-      </p:sp>
-      <p:pic>
-        <p:nvPicPr>
-          <p:cNvPr id="15" name="Picture 14">
-            <a:extLst>
-              <a:ext uri="{FF2B5EF4-FFF2-40B4-BE49-F238E27FC236}">
-                <a16:creationId xmlns:a16="http://schemas.microsoft.com/office/drawing/2014/main" id="{14EA5CA9-174B-B19D-B9DC-E8396C0768FF}"/>
-              </a:ext>
-            </a:extLst>
-          </p:cNvPr>
-          <p:cNvPicPr>
-            <a:picLocks noChangeAspect="1"/>
-          </p:cNvPicPr>
-          <p:nvPr/>
-        </p:nvPicPr>
-        <p:blipFill>
-          <a:blip r:embed="rId3"/>
-          <a:stretch>
-            <a:fillRect/>
-          </a:stretch>
-        </p:blipFill>
-        <p:spPr>
-          <a:xfrm>
-            <a:off x="8523287" y="2282999"/>
-            <a:ext cx="8505825" cy="2762250"/>
-          </a:xfrm>
-          <a:prstGeom prst="rect">
-            <a:avLst/>
-          </a:prstGeom>
-        </p:spPr>
-      </p:pic>
-    </p:spTree>
-    <p:extLst>
-      <p:ext uri="{BB962C8B-B14F-4D97-AF65-F5344CB8AC3E}">
-        <p14:creationId xmlns:p14="http://schemas.microsoft.com/office/powerpoint/2010/main" val="2500783336"/>
-      </p:ext>
-    </p:extLst>
-  </p:cSld>
-  <p:clrMapOvr>
-    <a:masterClrMapping/>
-  </p:clrMapOvr>
-</p:sld>
-</file>
-
 <file path=ppt/slides/slide7.xml><?xml version="1.0" encoding="utf-8"?>
 <p:sld xmlns:a="http://schemas.openxmlformats.org/drawingml/2006/main" xmlns:r="http://schemas.openxmlformats.org/officeDocument/2006/relationships" xmlns:p="http://schemas.openxmlformats.org/presentationml/2006/main">
   <p:cSld>
@@ -11522,7 +12437,7 @@
           <p:cNvPr id="2" name="Title 1">
             <a:extLst>
               <a:ext uri="{FF2B5EF4-FFF2-40B4-BE49-F238E27FC236}">
-                <a16:creationId xmlns:a16="http://schemas.microsoft.com/office/drawing/2014/main" id="{27ABB4F1-0817-B384-2169-DB48A555476B}"/>
+                <a16:creationId xmlns:a16="http://schemas.microsoft.com/office/drawing/2014/main" id="{66E9E7E8-8395-CE35-E099-E982CC088362}"/>
               </a:ext>
             </a:extLst>
           </p:cNvPr>
@@ -11540,17 +12455,35 @@
           <a:p>
             <a:r>
               <a:rPr lang="en-US" dirty="0"/>
-              <a:t>Python scripts</a:t>
-            </a:r>
-          </a:p>
-        </p:txBody>
+              <a:t>VSCode</a:t>
+            </a:r>
+          </a:p>
+        </p:txBody>
+      </p:sp>
+      <p:sp>
+        <p:nvSpPr>
+          <p:cNvPr id="3" name="Picture Placeholder 2">
+            <a:extLst>
+              <a:ext uri="{FF2B5EF4-FFF2-40B4-BE49-F238E27FC236}">
+                <a16:creationId xmlns:a16="http://schemas.microsoft.com/office/drawing/2014/main" id="{0EC18760-1AE3-BC05-FDA7-1DB5016B5EE8}"/>
+              </a:ext>
+            </a:extLst>
+          </p:cNvPr>
+          <p:cNvSpPr>
+            <a:spLocks noGrp="1"/>
+          </p:cNvSpPr>
+          <p:nvPr>
+            <p:ph type="pic" sz="quarter" idx="13"/>
+          </p:nvPr>
+        </p:nvSpPr>
+        <p:spPr/>
       </p:sp>
       <p:sp>
         <p:nvSpPr>
           <p:cNvPr id="4" name="Text Placeholder 3">
             <a:extLst>
               <a:ext uri="{FF2B5EF4-FFF2-40B4-BE49-F238E27FC236}">
-                <a16:creationId xmlns:a16="http://schemas.microsoft.com/office/drawing/2014/main" id="{910E7D7A-2B7E-EA93-FA3B-345CA961111B}"/>
+                <a16:creationId xmlns:a16="http://schemas.microsoft.com/office/drawing/2014/main" id="{13B1973E-61C0-CFB1-F807-35FF2760637B}"/>
               </a:ext>
             </a:extLst>
           </p:cNvPr>
@@ -11563,7 +12496,7 @@
         </p:nvSpPr>
         <p:spPr>
           <a:xfrm>
-            <a:off x="1913810" y="1815080"/>
+            <a:off x="1938863" y="1861769"/>
             <a:ext cx="14857224" cy="754581"/>
           </a:xfrm>
         </p:spPr>
@@ -11573,11 +12506,8 @@
           <a:p>
             <a:r>
               <a:rPr lang="en-US" dirty="0"/>
-              <a:t>GitHub repository</a:t>
-            </a:r>
-          </a:p>
-          <a:p>
-            <a:endParaRPr lang="en-US" dirty="0"/>
+              <a:t>Clone repository</a:t>
+            </a:r>
           </a:p>
         </p:txBody>
       </p:sp>
@@ -11586,7 +12516,7 @@
           <p:cNvPr id="6" name="Text Placeholder 5">
             <a:extLst>
               <a:ext uri="{FF2B5EF4-FFF2-40B4-BE49-F238E27FC236}">
-                <a16:creationId xmlns:a16="http://schemas.microsoft.com/office/drawing/2014/main" id="{7C8EE577-5F5D-8765-45BE-0CBD2993B90E}"/>
+                <a16:creationId xmlns:a16="http://schemas.microsoft.com/office/drawing/2014/main" id="{1490B96C-852F-89F0-18DE-558F8B369F31}"/>
               </a:ext>
             </a:extLst>
           </p:cNvPr>
@@ -11599,46 +12529,107 @@
         </p:nvSpPr>
         <p:spPr>
           <a:xfrm>
-            <a:off x="1913810" y="2848339"/>
-            <a:ext cx="14857224" cy="3777522"/>
-          </a:xfrm>
-        </p:spPr>
-        <p:txBody>
-          <a:bodyPr/>
+            <a:off x="1938863" y="2790607"/>
+            <a:ext cx="14857224" cy="2133676"/>
+          </a:xfrm>
+        </p:spPr>
+        <p:txBody>
+          <a:bodyPr>
+            <a:normAutofit/>
+          </a:bodyPr>
           <a:lstStyle/>
           <a:p>
             <a:r>
-              <a:rPr lang="en-US" dirty="0"/>
-              <a:t>https://github.com/assetfuture/Public-API-samples</a:t>
+              <a:rPr lang="en-US" sz="1700" dirty="0"/>
+              <a:t>Under source control</a:t>
             </a:r>
           </a:p>
           <a:p>
             <a:pPr lvl="1"/>
             <a:r>
-              <a:rPr lang="en-US" dirty="0"/>
-              <a:t>Getting Started</a:t>
-            </a:r>
-          </a:p>
-          <a:p>
-            <a:pPr lvl="2"/>
-            <a:r>
-              <a:rPr lang="en-US" dirty="0"/>
-              <a:t>Get Areas</a:t>
-            </a:r>
-          </a:p>
-          <a:p>
-            <a:pPr lvl="2"/>
-            <a:r>
-              <a:rPr lang="en-US" dirty="0"/>
-              <a:t>Post Areas</a:t>
-            </a:r>
-          </a:p>
-        </p:txBody>
-      </p:sp>
+              <a:rPr lang="en-US" sz="1020" dirty="0"/>
+              <a:t>Clone Repository</a:t>
+            </a:r>
+          </a:p>
+          <a:p>
+            <a:pPr lvl="1"/>
+            <a:r>
+              <a:rPr lang="en-US" sz="1020" dirty="0"/>
+              <a:t>Provide the repository </a:t>
+            </a:r>
+            <a:r>
+              <a:rPr lang="en-US" sz="1020" dirty="0" err="1"/>
+              <a:t>Url</a:t>
+            </a:r>
+            <a:endParaRPr lang="en-US" sz="1020" dirty="0"/>
+          </a:p>
+          <a:p>
+            <a:pPr lvl="1"/>
+            <a:r>
+              <a:rPr lang="en-US" sz="1020" dirty="0"/>
+              <a:t>Select the repository location</a:t>
+            </a:r>
+          </a:p>
+          <a:p>
+            <a:r>
+              <a:rPr lang="en-US" sz="1700" dirty="0"/>
+              <a:t>Open the folder</a:t>
+            </a:r>
+          </a:p>
+          <a:p>
+            <a:pPr lvl="1"/>
+            <a:r>
+              <a:rPr lang="en-US" sz="1020" dirty="0"/>
+              <a:t>Open Explorer from “Actions” Bar</a:t>
+            </a:r>
+          </a:p>
+          <a:p>
+            <a:pPr lvl="1"/>
+            <a:r>
+              <a:rPr lang="en-US" sz="1020" dirty="0"/>
+              <a:t>Open folder</a:t>
+            </a:r>
+          </a:p>
+          <a:p>
+            <a:pPr lvl="1"/>
+            <a:endParaRPr lang="en-US" sz="1020" dirty="0"/>
+          </a:p>
+        </p:txBody>
+      </p:sp>
+      <p:pic>
+        <p:nvPicPr>
+          <p:cNvPr id="15" name="Picture 14">
+            <a:extLst>
+              <a:ext uri="{FF2B5EF4-FFF2-40B4-BE49-F238E27FC236}">
+                <a16:creationId xmlns:a16="http://schemas.microsoft.com/office/drawing/2014/main" id="{14EA5CA9-174B-B19D-B9DC-E8396C0768FF}"/>
+              </a:ext>
+            </a:extLst>
+          </p:cNvPr>
+          <p:cNvPicPr>
+            <a:picLocks noChangeAspect="1"/>
+          </p:cNvPicPr>
+          <p:nvPr/>
+        </p:nvPicPr>
+        <p:blipFill>
+          <a:blip r:embed="rId3"/>
+          <a:stretch>
+            <a:fillRect/>
+          </a:stretch>
+        </p:blipFill>
+        <p:spPr>
+          <a:xfrm>
+            <a:off x="8523287" y="2282999"/>
+            <a:ext cx="8505825" cy="2762250"/>
+          </a:xfrm>
+          <a:prstGeom prst="rect">
+            <a:avLst/>
+          </a:prstGeom>
+        </p:spPr>
+      </p:pic>
     </p:spTree>
     <p:extLst>
       <p:ext uri="{BB962C8B-B14F-4D97-AF65-F5344CB8AC3E}">
-        <p14:creationId xmlns:p14="http://schemas.microsoft.com/office/powerpoint/2010/main" val="1604778364"/>
+        <p14:creationId xmlns:p14="http://schemas.microsoft.com/office/powerpoint/2010/main" val="2500783336"/>
       </p:ext>
     </p:extLst>
   </p:cSld>
@@ -11670,7 +12661,7 @@
           <p:cNvPr id="2" name="Title 1">
             <a:extLst>
               <a:ext uri="{FF2B5EF4-FFF2-40B4-BE49-F238E27FC236}">
-                <a16:creationId xmlns:a16="http://schemas.microsoft.com/office/drawing/2014/main" id="{0E6B7BC1-84C7-7BDA-262F-2C6527A99225}"/>
+                <a16:creationId xmlns:a16="http://schemas.microsoft.com/office/drawing/2014/main" id="{27ABB4F1-0817-B384-2169-DB48A555476B}"/>
               </a:ext>
             </a:extLst>
           </p:cNvPr>
@@ -11687,270 +12678,98 @@
           <a:lstStyle/>
           <a:p>
             <a:r>
-              <a:rPr lang="en-US" dirty="0">
-                <a:latin typeface="Proxima Nova" panose="02000506030000020004" pitchFamily="50" charset="0"/>
-              </a:rPr>
-              <a:t>Resources</a:t>
-            </a:r>
-          </a:p>
-        </p:txBody>
-      </p:sp>
-      <p:sp>
-        <p:nvSpPr>
-          <p:cNvPr id="7" name="Content Placeholder 2">
-            <a:extLst>
-              <a:ext uri="{FF2B5EF4-FFF2-40B4-BE49-F238E27FC236}">
-                <a16:creationId xmlns:a16="http://schemas.microsoft.com/office/drawing/2014/main" id="{E23826C6-3A07-A9DB-831D-B821C5CACD82}"/>
-              </a:ext>
-            </a:extLst>
-          </p:cNvPr>
-          <p:cNvSpPr txBox="1">
-            <a:spLocks/>
-          </p:cNvSpPr>
-          <p:nvPr/>
-        </p:nvSpPr>
-        <p:spPr>
-          <a:xfrm>
-            <a:off x="2998339" y="2819876"/>
-            <a:ext cx="8938260" cy="5389404"/>
-          </a:xfrm>
-          <a:prstGeom prst="rect">
-            <a:avLst/>
-          </a:prstGeom>
+              <a:rPr lang="en-US" dirty="0"/>
+              <a:t>Python scripts</a:t>
+            </a:r>
+          </a:p>
+        </p:txBody>
+      </p:sp>
+      <p:sp>
+        <p:nvSpPr>
+          <p:cNvPr id="4" name="Text Placeholder 3">
+            <a:extLst>
+              <a:ext uri="{FF2B5EF4-FFF2-40B4-BE49-F238E27FC236}">
+                <a16:creationId xmlns:a16="http://schemas.microsoft.com/office/drawing/2014/main" id="{910E7D7A-2B7E-EA93-FA3B-345CA961111B}"/>
+              </a:ext>
+            </a:extLst>
+          </p:cNvPr>
+          <p:cNvSpPr>
+            <a:spLocks noGrp="1"/>
+          </p:cNvSpPr>
+          <p:nvPr>
+            <p:ph type="body" sz="quarter" idx="14"/>
+          </p:nvPr>
+        </p:nvSpPr>
+        <p:spPr>
+          <a:xfrm>
+            <a:off x="1913810" y="1815080"/>
+            <a:ext cx="14857224" cy="754581"/>
+          </a:xfrm>
         </p:spPr>
         <p:txBody>
           <a:bodyPr/>
-          <a:lstStyle>
-            <a:lvl1pPr marL="342900" indent="-342900" algn="l" defTabSz="914400" rtl="0" eaLnBrk="1" latinLnBrk="0" hangingPunct="1">
-              <a:spcBef>
-                <a:spcPct val="20000"/>
-              </a:spcBef>
-              <a:buFont typeface="Arial" pitchFamily="34" charset="0"/>
-              <a:buChar char="•"/>
-              <a:defRPr sz="3200" b="0" i="0" kern="1200">
-                <a:solidFill>
-                  <a:schemeClr val="tx1"/>
-                </a:solidFill>
-                <a:latin typeface="Proxima Nova Alt Rg" panose="02000506030000020004" pitchFamily="2" charset="77"/>
-                <a:ea typeface="+mn-ea"/>
-                <a:cs typeface="+mn-cs"/>
-              </a:defRPr>
-            </a:lvl1pPr>
-            <a:lvl2pPr marL="742950" indent="-285750" algn="l" defTabSz="914400" rtl="0" eaLnBrk="1" latinLnBrk="0" hangingPunct="1">
-              <a:spcBef>
-                <a:spcPct val="20000"/>
-              </a:spcBef>
-              <a:buFont typeface="Arial" pitchFamily="34" charset="0"/>
-              <a:buChar char="–"/>
-              <a:defRPr sz="2800" b="0" i="0" kern="1200">
-                <a:solidFill>
-                  <a:schemeClr val="tx1"/>
-                </a:solidFill>
-                <a:latin typeface="Proxima Nova Alt Rg" panose="02000506030000020004" pitchFamily="2" charset="77"/>
-                <a:ea typeface="+mn-ea"/>
-                <a:cs typeface="+mn-cs"/>
-              </a:defRPr>
-            </a:lvl2pPr>
-            <a:lvl3pPr marL="1143000" indent="-228600" algn="l" defTabSz="914400" rtl="0" eaLnBrk="1" latinLnBrk="0" hangingPunct="1">
-              <a:spcBef>
-                <a:spcPct val="20000"/>
-              </a:spcBef>
-              <a:buFont typeface="Arial" pitchFamily="34" charset="0"/>
-              <a:buChar char="•"/>
-              <a:defRPr sz="2400" b="0" i="0" kern="1200">
-                <a:solidFill>
-                  <a:schemeClr val="tx1"/>
-                </a:solidFill>
-                <a:latin typeface="Proxima Nova Alt Rg" panose="02000506030000020004" pitchFamily="2" charset="77"/>
-                <a:ea typeface="+mn-ea"/>
-                <a:cs typeface="+mn-cs"/>
-              </a:defRPr>
-            </a:lvl3pPr>
-            <a:lvl4pPr marL="1600200" indent="-228600" algn="l" defTabSz="914400" rtl="0" eaLnBrk="1" latinLnBrk="0" hangingPunct="1">
-              <a:spcBef>
-                <a:spcPct val="20000"/>
-              </a:spcBef>
-              <a:buFont typeface="Arial" pitchFamily="34" charset="0"/>
-              <a:buChar char="–"/>
-              <a:defRPr sz="2000" b="0" i="0" kern="1200">
-                <a:solidFill>
-                  <a:schemeClr val="tx1"/>
-                </a:solidFill>
-                <a:latin typeface="Proxima Nova Alt Rg" panose="02000506030000020004" pitchFamily="2" charset="77"/>
-                <a:ea typeface="+mn-ea"/>
-                <a:cs typeface="+mn-cs"/>
-              </a:defRPr>
-            </a:lvl4pPr>
-            <a:lvl5pPr marL="2057400" indent="-228600" algn="l" defTabSz="914400" rtl="0" eaLnBrk="1" latinLnBrk="0" hangingPunct="1">
-              <a:spcBef>
-                <a:spcPct val="20000"/>
-              </a:spcBef>
-              <a:buFont typeface="Arial" pitchFamily="34" charset="0"/>
-              <a:buChar char="»"/>
-              <a:defRPr sz="2000" b="0" i="0" kern="1200">
-                <a:solidFill>
-                  <a:schemeClr val="tx1"/>
-                </a:solidFill>
-                <a:latin typeface="Proxima Nova Alt Rg" panose="02000506030000020004" pitchFamily="2" charset="77"/>
-                <a:ea typeface="+mn-ea"/>
-                <a:cs typeface="+mn-cs"/>
-              </a:defRPr>
-            </a:lvl5pPr>
-            <a:lvl6pPr marL="2514600" indent="-228600" algn="l" defTabSz="914400" rtl="0" eaLnBrk="1" latinLnBrk="0" hangingPunct="1">
-              <a:spcBef>
-                <a:spcPct val="20000"/>
-              </a:spcBef>
-              <a:buFont typeface="Arial" pitchFamily="34" charset="0"/>
-              <a:buChar char="•"/>
-              <a:defRPr sz="2000" kern="1200">
-                <a:solidFill>
-                  <a:schemeClr val="tx1"/>
-                </a:solidFill>
-                <a:latin typeface="+mn-lt"/>
-                <a:ea typeface="+mn-ea"/>
-                <a:cs typeface="+mn-cs"/>
-              </a:defRPr>
-            </a:lvl6pPr>
-            <a:lvl7pPr marL="2971800" indent="-228600" algn="l" defTabSz="914400" rtl="0" eaLnBrk="1" latinLnBrk="0" hangingPunct="1">
-              <a:spcBef>
-                <a:spcPct val="20000"/>
-              </a:spcBef>
-              <a:buFont typeface="Arial" pitchFamily="34" charset="0"/>
-              <a:buChar char="•"/>
-              <a:defRPr sz="2000" kern="1200">
-                <a:solidFill>
-                  <a:schemeClr val="tx1"/>
-                </a:solidFill>
-                <a:latin typeface="+mn-lt"/>
-                <a:ea typeface="+mn-ea"/>
-                <a:cs typeface="+mn-cs"/>
-              </a:defRPr>
-            </a:lvl7pPr>
-            <a:lvl8pPr marL="3429000" indent="-228600" algn="l" defTabSz="914400" rtl="0" eaLnBrk="1" latinLnBrk="0" hangingPunct="1">
-              <a:spcBef>
-                <a:spcPct val="20000"/>
-              </a:spcBef>
-              <a:buFont typeface="Arial" pitchFamily="34" charset="0"/>
-              <a:buChar char="•"/>
-              <a:defRPr sz="2000" kern="1200">
-                <a:solidFill>
-                  <a:schemeClr val="tx1"/>
-                </a:solidFill>
-                <a:latin typeface="+mn-lt"/>
-                <a:ea typeface="+mn-ea"/>
-                <a:cs typeface="+mn-cs"/>
-              </a:defRPr>
-            </a:lvl8pPr>
-            <a:lvl9pPr marL="3886200" indent="-228600" algn="l" defTabSz="914400" rtl="0" eaLnBrk="1" latinLnBrk="0" hangingPunct="1">
-              <a:spcBef>
-                <a:spcPct val="20000"/>
-              </a:spcBef>
-              <a:buFont typeface="Arial" pitchFamily="34" charset="0"/>
-              <a:buChar char="•"/>
-              <a:defRPr sz="2000" kern="1200">
-                <a:solidFill>
-                  <a:schemeClr val="tx1"/>
-                </a:solidFill>
-                <a:latin typeface="+mn-lt"/>
-                <a:ea typeface="+mn-ea"/>
-                <a:cs typeface="+mn-cs"/>
-              </a:defRPr>
-            </a:lvl9pPr>
-          </a:lstStyle>
-          <a:p>
-            <a:r>
-              <a:rPr lang="en-US" sz="2720" dirty="0"/>
-              <a:t>Learning:</a:t>
+          <a:lstStyle/>
+          <a:p>
+            <a:r>
+              <a:rPr lang="en-US" dirty="0"/>
+              <a:t>GitHub repository</a:t>
+            </a:r>
+          </a:p>
+          <a:p>
+            <a:endParaRPr lang="en-US" dirty="0"/>
+          </a:p>
+        </p:txBody>
+      </p:sp>
+      <p:sp>
+        <p:nvSpPr>
+          <p:cNvPr id="6" name="Text Placeholder 5">
+            <a:extLst>
+              <a:ext uri="{FF2B5EF4-FFF2-40B4-BE49-F238E27FC236}">
+                <a16:creationId xmlns:a16="http://schemas.microsoft.com/office/drawing/2014/main" id="{7C8EE577-5F5D-8765-45BE-0CBD2993B90E}"/>
+              </a:ext>
+            </a:extLst>
+          </p:cNvPr>
+          <p:cNvSpPr>
+            <a:spLocks noGrp="1"/>
+          </p:cNvSpPr>
+          <p:nvPr>
+            <p:ph type="body" sz="quarter" idx="16"/>
+          </p:nvPr>
+        </p:nvSpPr>
+        <p:spPr>
+          <a:xfrm>
+            <a:off x="1913810" y="2848339"/>
+            <a:ext cx="14857224" cy="3777522"/>
+          </a:xfrm>
+        </p:spPr>
+        <p:txBody>
+          <a:bodyPr/>
+          <a:lstStyle/>
+          <a:p>
+            <a:r>
+              <a:rPr lang="en-US" dirty="0"/>
+              <a:t>https://github.com/assetfuture/Public-API-samples</a:t>
             </a:r>
           </a:p>
           <a:p>
             <a:pPr lvl="1"/>
             <a:r>
-              <a:rPr lang="en-US" sz="2320" dirty="0"/>
-              <a:t>Python</a:t>
+              <a:rPr lang="en-US" dirty="0"/>
+              <a:t>Getting Started</a:t>
             </a:r>
           </a:p>
           <a:p>
             <a:pPr lvl="2"/>
             <a:r>
-              <a:rPr lang="en-US" sz="1640" dirty="0"/>
-              <a:t>Official site: https://www.python.org/about/gettingstarted/</a:t>
-            </a:r>
-          </a:p>
-          <a:p>
-            <a:pPr lvl="1"/>
-            <a:r>
-              <a:rPr lang="en-US" sz="2040" dirty="0"/>
-              <a:t>VSCode</a:t>
+              <a:rPr lang="en-US" dirty="0"/>
+              <a:t>Get Areas.py</a:t>
             </a:r>
           </a:p>
           <a:p>
             <a:pPr lvl="2"/>
             <a:r>
-              <a:rPr lang="en-US" sz="1640" dirty="0"/>
-              <a:t>Official site: </a:t>
-            </a:r>
-            <a:r>
-              <a:rPr lang="en-US" sz="1640" dirty="0">
-                <a:hlinkClick r:id="rId2"/>
-              </a:rPr>
-              <a:t>https://code.visualstudio.com/docs/introvideos/basics</a:t>
-            </a:r>
-            <a:endParaRPr lang="en-US" sz="1640" dirty="0"/>
-          </a:p>
-          <a:p>
-            <a:pPr marL="914400" lvl="2" indent="0">
-              <a:buNone/>
-            </a:pPr>
-            <a:endParaRPr lang="en-US" sz="1640" dirty="0"/>
-          </a:p>
-          <a:p>
-            <a:r>
-              <a:rPr lang="en-US" sz="2720" dirty="0"/>
-              <a:t>Installers</a:t>
-            </a:r>
-            <a:endParaRPr lang="en-US" sz="2720" dirty="0">
-              <a:hlinkClick r:id="rId3"/>
-            </a:endParaRPr>
-          </a:p>
-          <a:p>
-            <a:pPr lvl="1"/>
-            <a:r>
-              <a:rPr lang="en-US" sz="2320" dirty="0">
-                <a:hlinkClick r:id="rId3"/>
-              </a:rPr>
-              <a:t>Python 3.10.4</a:t>
-            </a:r>
-            <a:endParaRPr lang="en-US" sz="2320" dirty="0"/>
-          </a:p>
-          <a:p>
-            <a:pPr lvl="2"/>
-            <a:r>
-              <a:rPr lang="en-US" sz="1640" dirty="0"/>
-              <a:t>Official site - https://www.python.org/downloads/</a:t>
-            </a:r>
-            <a:endParaRPr lang="en-US" sz="2720" dirty="0">
-              <a:hlinkClick r:id="rId4"/>
-            </a:endParaRPr>
-          </a:p>
-          <a:p>
-            <a:pPr lvl="1"/>
-            <a:r>
-              <a:rPr lang="en-US" sz="2320" dirty="0">
-                <a:hlinkClick r:id="rId4"/>
-              </a:rPr>
-              <a:t>VSCode</a:t>
-            </a:r>
-            <a:r>
-              <a:rPr lang="en-US" sz="2320" dirty="0"/>
-              <a:t> </a:t>
-            </a:r>
-          </a:p>
-          <a:p>
-            <a:pPr lvl="2"/>
-            <a:r>
-              <a:rPr lang="en-US" sz="1640" dirty="0"/>
-              <a:t>Official site - https://code.visualstudio.com/download</a:t>
+              <a:rPr lang="en-US" dirty="0"/>
+              <a:t>Post Areas.py</a:t>
             </a:r>
           </a:p>
         </p:txBody>
@@ -11958,7 +12777,7 @@
     </p:spTree>
     <p:extLst>
       <p:ext uri="{BB962C8B-B14F-4D97-AF65-F5344CB8AC3E}">
-        <p14:creationId xmlns:p14="http://schemas.microsoft.com/office/powerpoint/2010/main" val="2045114893"/>
+        <p14:creationId xmlns:p14="http://schemas.microsoft.com/office/powerpoint/2010/main" val="1604778364"/>
       </p:ext>
     </p:extLst>
   </p:cSld>
@@ -11971,14 +12790,6 @@
 <file path=ppt/slides/slide9.xml><?xml version="1.0" encoding="utf-8"?>
 <p:sld xmlns:a="http://schemas.openxmlformats.org/drawingml/2006/main" xmlns:r="http://schemas.openxmlformats.org/officeDocument/2006/relationships" xmlns:p="http://schemas.openxmlformats.org/presentationml/2006/main">
   <p:cSld>
-    <p:bg>
-      <p:bgPr>
-        <a:solidFill>
-          <a:schemeClr val="tx1"/>
-        </a:solidFill>
-        <a:effectLst/>
-      </p:bgPr>
-    </p:bg>
     <p:spTree>
       <p:nvGrpSpPr>
         <p:cNvPr id="1" name=""/>
@@ -11995,10 +12806,10 @@
       </p:grpSpPr>
       <p:sp>
         <p:nvSpPr>
-          <p:cNvPr id="7" name="Title 1">
-            <a:extLst>
-              <a:ext uri="{FF2B5EF4-FFF2-40B4-BE49-F238E27FC236}">
-                <a16:creationId xmlns:a16="http://schemas.microsoft.com/office/drawing/2014/main" id="{A995580D-4D36-D64F-826F-5A991AD9F8BC}"/>
+          <p:cNvPr id="2" name="Title 1">
+            <a:extLst>
+              <a:ext uri="{FF2B5EF4-FFF2-40B4-BE49-F238E27FC236}">
+                <a16:creationId xmlns:a16="http://schemas.microsoft.com/office/drawing/2014/main" id="{DE6B604E-0D0B-CE9E-9F23-398A85F98320}"/>
               </a:ext>
             </a:extLst>
           </p:cNvPr>
@@ -12009,34 +12820,159 @@
             <p:ph type="title"/>
           </p:nvPr>
         </p:nvSpPr>
-        <p:spPr>
-          <a:xfrm>
-            <a:off x="6663567" y="4183489"/>
-            <a:ext cx="4960869" cy="2111771"/>
-          </a:xfrm>
-        </p:spPr>
+        <p:spPr/>
         <p:txBody>
           <a:bodyPr/>
           <a:lstStyle/>
           <a:p>
-            <a:pPr algn="ctr"/>
-            <a:r>
-              <a:rPr lang="en-US">
-                <a:solidFill>
-                  <a:schemeClr val="bg1"/>
-                </a:solidFill>
-              </a:rPr>
-              <a:t>Thank you</a:t>
+            <a:r>
+              <a:rPr lang="en-US" dirty="0"/>
+              <a:t>Python Scripts</a:t>
+            </a:r>
+          </a:p>
+        </p:txBody>
+      </p:sp>
+      <p:sp>
+        <p:nvSpPr>
+          <p:cNvPr id="4" name="Text Placeholder 3">
+            <a:extLst>
+              <a:ext uri="{FF2B5EF4-FFF2-40B4-BE49-F238E27FC236}">
+                <a16:creationId xmlns:a16="http://schemas.microsoft.com/office/drawing/2014/main" id="{72998583-C5BD-C4F6-185A-303867650F82}"/>
+              </a:ext>
+            </a:extLst>
+          </p:cNvPr>
+          <p:cNvSpPr>
+            <a:spLocks noGrp="1"/>
+          </p:cNvSpPr>
+          <p:nvPr>
+            <p:ph type="body" sz="quarter" idx="14"/>
+          </p:nvPr>
+        </p:nvSpPr>
+        <p:spPr>
+          <a:xfrm>
+            <a:off x="1913810" y="1754850"/>
+            <a:ext cx="14857224" cy="754581"/>
+          </a:xfrm>
+        </p:spPr>
+        <p:txBody>
+          <a:bodyPr/>
+          <a:lstStyle/>
+          <a:p>
+            <a:r>
+              <a:rPr lang="en-US" dirty="0"/>
+              <a:t>Download Data using APIs</a:t>
+            </a:r>
+          </a:p>
+        </p:txBody>
+      </p:sp>
+      <p:sp>
+        <p:nvSpPr>
+          <p:cNvPr id="5" name="Text Placeholder 4">
+            <a:extLst>
+              <a:ext uri="{FF2B5EF4-FFF2-40B4-BE49-F238E27FC236}">
+                <a16:creationId xmlns:a16="http://schemas.microsoft.com/office/drawing/2014/main" id="{4A4F83AD-8D2A-D6BA-C917-9DA49C019E7E}"/>
+              </a:ext>
+            </a:extLst>
+          </p:cNvPr>
+          <p:cNvSpPr>
+            <a:spLocks noGrp="1"/>
+          </p:cNvSpPr>
+          <p:nvPr>
+            <p:ph type="body" sz="quarter" idx="15"/>
+          </p:nvPr>
+        </p:nvSpPr>
+        <p:spPr>
+          <a:xfrm>
+            <a:off x="1938863" y="2509431"/>
+            <a:ext cx="14857224" cy="6152431"/>
+          </a:xfrm>
+        </p:spPr>
+        <p:txBody>
+          <a:bodyPr>
+            <a:normAutofit/>
+          </a:bodyPr>
+          <a:lstStyle/>
+          <a:p>
+            <a:r>
+              <a:rPr lang="en-US" sz="2800" dirty="0"/>
+              <a:t>To upload data using APIs with Python script:</a:t>
+            </a:r>
+          </a:p>
+          <a:p>
+            <a:pPr marL="514350" indent="-514350">
+              <a:buAutoNum type="arabicPeriod"/>
+            </a:pPr>
+            <a:r>
+              <a:rPr lang="en-US" sz="2800" dirty="0"/>
+              <a:t>Install &amp; import relevant packages (Line 1)</a:t>
+            </a:r>
+          </a:p>
+          <a:p>
+            <a:pPr marL="514350" indent="-514350">
+              <a:buAutoNum type="arabicPeriod"/>
+            </a:pPr>
+            <a:r>
+              <a:rPr lang="en-US" sz="2800" dirty="0"/>
+              <a:t>Prepare the API request (Lines 3-5):</a:t>
+            </a:r>
+          </a:p>
+          <a:p>
+            <a:pPr marL="1145858" lvl="1" indent="-514350">
+              <a:buAutoNum type="arabicPeriod"/>
+            </a:pPr>
+            <a:r>
+              <a:rPr lang="en-US" sz="2000" dirty="0" err="1"/>
+              <a:t>Url</a:t>
+            </a:r>
+            <a:r>
+              <a:rPr lang="en-US" sz="2000" dirty="0"/>
+              <a:t> – URL to access the API (API endpoint)</a:t>
+            </a:r>
+          </a:p>
+          <a:p>
+            <a:pPr marL="1145858" lvl="1" indent="-514350">
+              <a:buAutoNum type="arabicPeriod"/>
+            </a:pPr>
+            <a:r>
+              <a:rPr lang="en-US" sz="2000" dirty="0"/>
+              <a:t>Parameters – Attributes to be included in the request</a:t>
+            </a:r>
+          </a:p>
+          <a:p>
+            <a:pPr marL="1145858" lvl="1" indent="-514350">
+              <a:buAutoNum type="arabicPeriod"/>
+            </a:pPr>
+            <a:r>
+              <a:rPr lang="en-US" sz="2000" dirty="0"/>
+              <a:t>Headers – Attributes to be included as Header</a:t>
+            </a:r>
+          </a:p>
+          <a:p>
+            <a:pPr marL="514350" indent="-514350">
+              <a:buAutoNum type="arabicPeriod"/>
+            </a:pPr>
+            <a:r>
+              <a:rPr lang="en-US" sz="2800" dirty="0"/>
+              <a:t>Capture the response (Line 3)</a:t>
+            </a:r>
+          </a:p>
+          <a:p>
+            <a:pPr marL="514350" indent="-514350">
+              <a:buAutoNum type="arabicPeriod"/>
+            </a:pPr>
+            <a:r>
+              <a:rPr lang="en-US" sz="2800" dirty="0"/>
+              <a:t>Once you have captured the response, you can transform the data in any way you want. (Lines 7-11)</a:t>
             </a:r>
           </a:p>
         </p:txBody>
       </p:sp>
       <p:pic>
         <p:nvPicPr>
-          <p:cNvPr id="9" name="Picture Placeholder 7">
-            <a:extLst>
-              <a:ext uri="{FF2B5EF4-FFF2-40B4-BE49-F238E27FC236}">
-                <a16:creationId xmlns:a16="http://schemas.microsoft.com/office/drawing/2014/main" id="{C4A0EFB0-883F-5B48-A8C4-15820844DF97}"/>
+          <p:cNvPr id="8" name="Picture 7">
+            <a:extLst>
+              <a:ext uri="{FF2B5EF4-FFF2-40B4-BE49-F238E27FC236}">
+                <a16:creationId xmlns:a16="http://schemas.microsoft.com/office/drawing/2014/main" id="{7CD2A4BA-6DA0-8B48-8A6C-2AC75341109E}"/>
               </a:ext>
             </a:extLst>
           </p:cNvPr>
@@ -12046,20 +12982,15 @@
           <p:nvPr/>
         </p:nvPicPr>
         <p:blipFill>
-          <a:blip r:embed="rId2">
-            <a:extLst>
-              <a:ext uri="{28A0092B-C50C-407E-A947-70E740481C1C}">
-                <a14:useLocalDpi xmlns:a14="http://schemas.microsoft.com/office/drawing/2010/main" val="0"/>
-              </a:ext>
-            </a:extLst>
-          </a:blip>
-          <a:srcRect/>
-          <a:stretch/>
+          <a:blip r:embed="rId2"/>
+          <a:stretch>
+            <a:fillRect/>
+          </a:stretch>
         </p:blipFill>
         <p:spPr>
           <a:xfrm>
-            <a:off x="8445365" y="3062967"/>
-            <a:ext cx="1397273" cy="1397273"/>
+            <a:off x="3391593" y="6791418"/>
+            <a:ext cx="14113358" cy="3110220"/>
           </a:xfrm>
           <a:prstGeom prst="rect">
             <a:avLst/>
@@ -12069,7 +13000,7 @@
     </p:spTree>
     <p:extLst>
       <p:ext uri="{BB962C8B-B14F-4D97-AF65-F5344CB8AC3E}">
-        <p14:creationId xmlns:p14="http://schemas.microsoft.com/office/powerpoint/2010/main" val="3802704287"/>
+        <p14:creationId xmlns:p14="http://schemas.microsoft.com/office/powerpoint/2010/main" val="1683538938"/>
       </p:ext>
     </p:extLst>
   </p:cSld>

</xml_diff>